<commit_message>
Some layout for section 2
</commit_message>
<xml_diff>
--- a/course/2 - The Internet/The Internet.pptx
+++ b/course/2 - The Internet/The Internet.pptx
@@ -5,28 +5,34 @@
     <p:sldMasterId id="2147483648" r:id="rId1"/>
   </p:sldMasterIdLst>
   <p:notesMasterIdLst>
-    <p:notesMasterId r:id="rId21"/>
+    <p:notesMasterId r:id="rId27"/>
   </p:notesMasterIdLst>
   <p:sldIdLst>
     <p:sldId id="256" r:id="rId2"/>
-    <p:sldId id="257" r:id="rId3"/>
-    <p:sldId id="259" r:id="rId4"/>
-    <p:sldId id="258" r:id="rId5"/>
-    <p:sldId id="264" r:id="rId6"/>
-    <p:sldId id="265" r:id="rId7"/>
-    <p:sldId id="260" r:id="rId8"/>
-    <p:sldId id="262" r:id="rId9"/>
-    <p:sldId id="266" r:id="rId10"/>
-    <p:sldId id="267" r:id="rId11"/>
-    <p:sldId id="268" r:id="rId12"/>
-    <p:sldId id="269" r:id="rId13"/>
-    <p:sldId id="270" r:id="rId14"/>
-    <p:sldId id="271" r:id="rId15"/>
-    <p:sldId id="272" r:id="rId16"/>
-    <p:sldId id="261" r:id="rId17"/>
-    <p:sldId id="263" r:id="rId18"/>
-    <p:sldId id="274" r:id="rId19"/>
-    <p:sldId id="273" r:id="rId20"/>
+    <p:sldId id="276" r:id="rId3"/>
+    <p:sldId id="257" r:id="rId4"/>
+    <p:sldId id="259" r:id="rId5"/>
+    <p:sldId id="258" r:id="rId6"/>
+    <p:sldId id="264" r:id="rId7"/>
+    <p:sldId id="265" r:id="rId8"/>
+    <p:sldId id="260" r:id="rId9"/>
+    <p:sldId id="262" r:id="rId10"/>
+    <p:sldId id="266" r:id="rId11"/>
+    <p:sldId id="267" r:id="rId12"/>
+    <p:sldId id="268" r:id="rId13"/>
+    <p:sldId id="269" r:id="rId14"/>
+    <p:sldId id="270" r:id="rId15"/>
+    <p:sldId id="271" r:id="rId16"/>
+    <p:sldId id="272" r:id="rId17"/>
+    <p:sldId id="261" r:id="rId18"/>
+    <p:sldId id="263" r:id="rId19"/>
+    <p:sldId id="277" r:id="rId20"/>
+    <p:sldId id="280" r:id="rId21"/>
+    <p:sldId id="278" r:id="rId22"/>
+    <p:sldId id="274" r:id="rId23"/>
+    <p:sldId id="273" r:id="rId24"/>
+    <p:sldId id="279" r:id="rId25"/>
+    <p:sldId id="275" r:id="rId26"/>
   </p:sldIdLst>
   <p:sldSz cx="9144000" cy="6858000" type="screen4x3"/>
   <p:notesSz cx="6858000" cy="9144000"/>
@@ -125,6 +131,22 @@
       </a:defRPr>
     </a:lvl9pPr>
   </p:defaultTextStyle>
+  <p:extLst>
+    <p:ext uri="{EFAFB233-063F-42B5-8137-9DF3F51BA10A}">
+      <p15:sldGuideLst xmlns:p15="http://schemas.microsoft.com/office/powerpoint/2012/main">
+        <p15:guide id="1" orient="horz" pos="2160">
+          <p15:clr>
+            <a:srgbClr val="A4A3A4"/>
+          </p15:clr>
+        </p15:guide>
+        <p15:guide id="2" pos="2880">
+          <p15:clr>
+            <a:srgbClr val="A4A3A4"/>
+          </p15:clr>
+        </p15:guide>
+      </p15:sldGuideLst>
+    </p:ext>
+  </p:extLst>
 </p:presentation>
 </file>
 
@@ -12241,7 +12263,7 @@
           <a:p>
             <a:fld id="{BB4B7B7F-B84D-8247-B3EC-5C5651617219}" type="datetimeFigureOut">
               <a:rPr lang="en-US" smtClean="0"/>
-              <a:t>3/28/15</a:t>
+              <a:t>4/13/2015</a:t>
             </a:fld>
             <a:endParaRPr lang="en-US"/>
           </a:p>
@@ -12667,17 +12689,7 @@
           <a:bodyPr/>
           <a:lstStyle/>
           <a:p>
-            <a:r>
-              <a:rPr lang="en-US" dirty="0" smtClean="0"/>
-              <a:t>This is</a:t>
-            </a:r>
-            <a:r>
-              <a:rPr lang="en-US" baseline="0" dirty="0" smtClean="0"/>
-              <a:t> the basic setup for what an http request looks like – nothing fancy or exciting</a:t>
-            </a:r>
-          </a:p>
-          <a:p>
-            <a:endParaRPr lang="en-US" dirty="0"/>
+            <a:endParaRPr lang="en-US" dirty="0" smtClean="0"/>
           </a:p>
         </p:txBody>
       </p:sp>
@@ -12707,7 +12719,7 @@
     </p:spTree>
     <p:extLst>
       <p:ext uri="{BB962C8B-B14F-4D97-AF65-F5344CB8AC3E}">
-        <p14:creationId xmlns:p14="http://schemas.microsoft.com/office/powerpoint/2010/main" val="1303872113"/>
+        <p14:creationId xmlns:p14="http://schemas.microsoft.com/office/powerpoint/2010/main" val="3640464061"/>
       </p:ext>
     </p:extLst>
   </p:cSld>
@@ -12763,23 +12775,11 @@
           <a:p>
             <a:r>
               <a:rPr lang="en-US" dirty="0" smtClean="0"/>
-              <a:t>http</a:t>
+              <a:t>This is</a:t>
             </a:r>
             <a:r>
               <a:rPr lang="en-US" baseline="0" dirty="0" smtClean="0"/>
-              <a:t> requests are all strings – strings are fun</a:t>
-            </a:r>
-          </a:p>
-          <a:p>
-            <a:r>
-              <a:rPr lang="en-US" baseline="0" dirty="0" smtClean="0"/>
-              <a:t>the top line has a VERB and a URL</a:t>
-            </a:r>
-          </a:p>
-          <a:p>
-            <a:r>
-              <a:rPr lang="en-US" baseline="0" dirty="0" smtClean="0"/>
-              <a:t>the second line tells us the protocol we’re using – then there are a bunch of key/value pairs that are HEADERs – additional information sent along</a:t>
+              <a:t> the basic setup for what an http request looks like – nothing fancy or exciting</a:t>
             </a:r>
           </a:p>
           <a:p>
@@ -12813,7 +12813,7 @@
     </p:spTree>
     <p:extLst>
       <p:ext uri="{BB962C8B-B14F-4D97-AF65-F5344CB8AC3E}">
-        <p14:creationId xmlns:p14="http://schemas.microsoft.com/office/powerpoint/2010/main" val="1287062809"/>
+        <p14:creationId xmlns:p14="http://schemas.microsoft.com/office/powerpoint/2010/main" val="1303872113"/>
       </p:ext>
     </p:extLst>
   </p:cSld>
@@ -12869,39 +12869,26 @@
           <a:p>
             <a:r>
               <a:rPr lang="en-US" dirty="0" smtClean="0"/>
-              <a:t>http responses have a response</a:t>
+              <a:t>http</a:t>
             </a:r>
             <a:r>
               <a:rPr lang="en-US" baseline="0" dirty="0" smtClean="0"/>
-              <a:t> code</a:t>
+              <a:t> requests are all strings – strings are fun</a:t>
             </a:r>
           </a:p>
           <a:p>
             <a:r>
               <a:rPr lang="en-US" baseline="0" dirty="0" smtClean="0"/>
-              <a:t>404 is a popular one I’ve bet you’ve seen</a:t>
+              <a:t>the top line has a VERB and a URL</a:t>
             </a:r>
           </a:p>
           <a:p>
             <a:r>
               <a:rPr lang="en-US" baseline="0" dirty="0" smtClean="0"/>
-              <a:t>then a bunch of key/value pairs for headers</a:t>
-            </a:r>
-          </a:p>
-          <a:p>
-            <a:r>
-              <a:rPr lang="en-US" baseline="0" dirty="0" smtClean="0"/>
-              <a:t>followed by the actual text portion of the http request</a:t>
-            </a:r>
-          </a:p>
-          <a:p>
-            <a:endParaRPr lang="en-US" baseline="0" dirty="0" smtClean="0"/>
-          </a:p>
-          <a:p>
-            <a:r>
-              <a:rPr lang="en-US" baseline="0" dirty="0" smtClean="0"/>
-              <a:t>notice the content-type – this is important because it tells the browser how to display things</a:t>
-            </a:r>
+              <a:t>the second line tells us the protocol we’re using – then there are a bunch of key/value pairs that are HEADERs – additional information sent along</a:t>
+            </a:r>
+          </a:p>
+          <a:p>
             <a:endParaRPr lang="en-US" dirty="0"/>
           </a:p>
         </p:txBody>
@@ -12988,25 +12975,38 @@
           <a:p>
             <a:r>
               <a:rPr lang="en-US" dirty="0" smtClean="0"/>
-              <a:t>the only ones you’re going</a:t>
+              <a:t>http responses have a response</a:t>
             </a:r>
             <a:r>
               <a:rPr lang="en-US" baseline="0" dirty="0" smtClean="0"/>
-              <a:t> to use with most </a:t>
-            </a:r>
-            <a:r>
-              <a:rPr lang="en-US" baseline="0" dirty="0" err="1" smtClean="0"/>
-              <a:t>php</a:t>
-            </a:r>
+              <a:t> code</a:t>
+            </a:r>
+          </a:p>
+          <a:p>
             <a:r>
               <a:rPr lang="en-US" baseline="0" dirty="0" smtClean="0"/>
-              <a:t> websites is get and post</a:t>
+              <a:t>404 is a popular one I’ve bet you’ve seen</a:t>
             </a:r>
           </a:p>
           <a:p>
             <a:r>
               <a:rPr lang="en-US" baseline="0" dirty="0" smtClean="0"/>
-              <a:t>if you create web services, you might use some of the other http verbs but that’s not something for a beginner to worry about</a:t>
+              <a:t>then a bunch of key/value pairs for headers</a:t>
+            </a:r>
+          </a:p>
+          <a:p>
+            <a:r>
+              <a:rPr lang="en-US" baseline="0" dirty="0" smtClean="0"/>
+              <a:t>followed by the actual text portion of the http request</a:t>
+            </a:r>
+          </a:p>
+          <a:p>
+            <a:endParaRPr lang="en-US" baseline="0" dirty="0" smtClean="0"/>
+          </a:p>
+          <a:p>
+            <a:r>
+              <a:rPr lang="en-US" baseline="0" dirty="0" smtClean="0"/>
+              <a:t>notice the content-type – this is important because it tells the browser how to display things</a:t>
             </a:r>
             <a:endParaRPr lang="en-US" dirty="0"/>
           </a:p>
@@ -13038,7 +13038,7 @@
     </p:spTree>
     <p:extLst>
       <p:ext uri="{BB962C8B-B14F-4D97-AF65-F5344CB8AC3E}">
-        <p14:creationId xmlns:p14="http://schemas.microsoft.com/office/powerpoint/2010/main" val="2116165398"/>
+        <p14:creationId xmlns:p14="http://schemas.microsoft.com/office/powerpoint/2010/main" val="1287062809"/>
       </p:ext>
     </p:extLst>
   </p:cSld>
@@ -13094,25 +13094,25 @@
           <a:p>
             <a:r>
               <a:rPr lang="en-US" dirty="0" smtClean="0"/>
-              <a:t>Again – most of these will be handled for you</a:t>
+              <a:t>the only ones you’re going</a:t>
             </a:r>
             <a:r>
               <a:rPr lang="en-US" baseline="0" dirty="0" smtClean="0"/>
-              <a:t> either by the server or PHP</a:t>
-            </a:r>
-          </a:p>
-          <a:p>
+              <a:t> to use with most </a:t>
+            </a:r>
+            <a:r>
+              <a:rPr lang="en-US" baseline="0" dirty="0" err="1" smtClean="0"/>
+              <a:t>php</a:t>
+            </a:r>
             <a:r>
               <a:rPr lang="en-US" baseline="0" dirty="0" smtClean="0"/>
-              <a:t>but you should still understand the basics of these </a:t>
-            </a:r>
-            <a:r>
-              <a:rPr lang="en-US" baseline="0" dirty="0" err="1" smtClean="0"/>
-              <a:t>reponses</a:t>
-            </a:r>
+              <a:t> websites is get and post</a:t>
+            </a:r>
+          </a:p>
+          <a:p>
             <a:r>
               <a:rPr lang="en-US" baseline="0" dirty="0" smtClean="0"/>
-              <a:t>, and that each set has a different purpose</a:t>
+              <a:t>if you create web services, you might use some of the other http verbs but that’s not something for a beginner to worry about</a:t>
             </a:r>
             <a:endParaRPr lang="en-US" dirty="0"/>
           </a:p>
@@ -13144,7 +13144,7 @@
     </p:spTree>
     <p:extLst>
       <p:ext uri="{BB962C8B-B14F-4D97-AF65-F5344CB8AC3E}">
-        <p14:creationId xmlns:p14="http://schemas.microsoft.com/office/powerpoint/2010/main" val="2098514477"/>
+        <p14:creationId xmlns:p14="http://schemas.microsoft.com/office/powerpoint/2010/main" val="2116165398"/>
       </p:ext>
     </p:extLst>
   </p:cSld>
@@ -13200,53 +13200,25 @@
           <a:p>
             <a:r>
               <a:rPr lang="en-US" dirty="0" smtClean="0"/>
-              <a:t>Clients</a:t>
+              <a:t>Again – most of these will be handled for you</a:t>
             </a:r>
             <a:r>
               <a:rPr lang="en-US" baseline="0" dirty="0" smtClean="0"/>
-              <a:t> take the information provided by an http request and do something with it</a:t>
-            </a:r>
-          </a:p>
-          <a:p>
-            <a:endParaRPr lang="en-US" baseline="0" dirty="0" smtClean="0"/>
+              <a:t> either by the server or PHP</a:t>
+            </a:r>
           </a:p>
           <a:p>
             <a:r>
               <a:rPr lang="en-US" baseline="0" dirty="0" smtClean="0"/>
-              <a:t>browsers are the most common tool, although you can also make http requests </a:t>
+              <a:t>but you should still understand the basics of these </a:t>
             </a:r>
             <a:r>
               <a:rPr lang="en-US" baseline="0" dirty="0" err="1" smtClean="0"/>
-              <a:t>programatically</a:t>
+              <a:t>reponses</a:t>
             </a:r>
             <a:r>
               <a:rPr lang="en-US" baseline="0" dirty="0" smtClean="0"/>
-              <a:t> or through tools such as curl</a:t>
-            </a:r>
-          </a:p>
-          <a:p>
-            <a:endParaRPr lang="en-US" baseline="0" dirty="0" smtClean="0"/>
-          </a:p>
-          <a:p>
-            <a:r>
-              <a:rPr lang="en-US" baseline="0" dirty="0" smtClean="0"/>
-              <a:t>your browser is the most important thing, however, because your browser speaks a special language – that language is HTML(</a:t>
-            </a:r>
-            <a:r>
-              <a:rPr lang="en-US" baseline="0" dirty="0" err="1" smtClean="0"/>
-              <a:t>css</a:t>
-            </a:r>
-            <a:r>
-              <a:rPr lang="en-US" baseline="0" dirty="0" smtClean="0"/>
-              <a:t>)(</a:t>
-            </a:r>
-            <a:r>
-              <a:rPr lang="en-US" baseline="0" dirty="0" err="1" smtClean="0"/>
-              <a:t>js</a:t>
-            </a:r>
-            <a:r>
-              <a:rPr lang="en-US" baseline="0" dirty="0" smtClean="0"/>
-              <a:t>)</a:t>
+              <a:t>, and that each set has a different purpose</a:t>
             </a:r>
             <a:endParaRPr lang="en-US" dirty="0"/>
           </a:p>
@@ -13278,7 +13250,7 @@
     </p:spTree>
     <p:extLst>
       <p:ext uri="{BB962C8B-B14F-4D97-AF65-F5344CB8AC3E}">
-        <p14:creationId xmlns:p14="http://schemas.microsoft.com/office/powerpoint/2010/main" val="2490861687"/>
+        <p14:creationId xmlns:p14="http://schemas.microsoft.com/office/powerpoint/2010/main" val="2098514477"/>
       </p:ext>
     </p:extLst>
   </p:cSld>
@@ -13334,19 +13306,53 @@
           <a:p>
             <a:r>
               <a:rPr lang="en-US" dirty="0" smtClean="0"/>
-              <a:t>html and </a:t>
-            </a:r>
-            <a:r>
-              <a:rPr lang="en-US" dirty="0" err="1" smtClean="0"/>
+              <a:t>Clients</a:t>
+            </a:r>
+            <a:r>
+              <a:rPr lang="en-US" baseline="0" dirty="0" smtClean="0"/>
+              <a:t> take the information provided by an http request and do something with it</a:t>
+            </a:r>
+          </a:p>
+          <a:p>
+            <a:endParaRPr lang="en-US" baseline="0" dirty="0" smtClean="0"/>
+          </a:p>
+          <a:p>
+            <a:r>
+              <a:rPr lang="en-US" baseline="0" dirty="0" smtClean="0"/>
+              <a:t>browsers are the most common tool, although you can also make http requests </a:t>
+            </a:r>
+            <a:r>
+              <a:rPr lang="en-US" baseline="0" dirty="0" err="1" smtClean="0"/>
+              <a:t>programatically</a:t>
+            </a:r>
+            <a:r>
+              <a:rPr lang="en-US" baseline="0" dirty="0" smtClean="0"/>
+              <a:t> or through tools such as curl</a:t>
+            </a:r>
+          </a:p>
+          <a:p>
+            <a:endParaRPr lang="en-US" baseline="0" dirty="0" smtClean="0"/>
+          </a:p>
+          <a:p>
+            <a:r>
+              <a:rPr lang="en-US" baseline="0" dirty="0" smtClean="0"/>
+              <a:t>your browser is the most important thing, however, because your browser speaks a special language – that language is HTML(</a:t>
+            </a:r>
+            <a:r>
+              <a:rPr lang="en-US" baseline="0" dirty="0" err="1" smtClean="0"/>
               <a:t>css</a:t>
             </a:r>
             <a:r>
-              <a:rPr lang="en-US" dirty="0" smtClean="0"/>
-              <a:t> are the “grammar” –</a:t>
-            </a:r>
-            <a:r>
               <a:rPr lang="en-US" baseline="0" dirty="0" smtClean="0"/>
-              <a:t> a standard method of markup and display for data</a:t>
+              <a:t>)(</a:t>
+            </a:r>
+            <a:r>
+              <a:rPr lang="en-US" baseline="0" dirty="0" err="1" smtClean="0"/>
+              <a:t>js</a:t>
+            </a:r>
+            <a:r>
+              <a:rPr lang="en-US" baseline="0" dirty="0" smtClean="0"/>
+              <a:t>)</a:t>
             </a:r>
             <a:endParaRPr lang="en-US" dirty="0"/>
           </a:p>
@@ -13378,7 +13384,7 @@
     </p:spTree>
     <p:extLst>
       <p:ext uri="{BB962C8B-B14F-4D97-AF65-F5344CB8AC3E}">
-        <p14:creationId xmlns:p14="http://schemas.microsoft.com/office/powerpoint/2010/main" val="505639497"/>
+        <p14:creationId xmlns:p14="http://schemas.microsoft.com/office/powerpoint/2010/main" val="2490861687"/>
       </p:ext>
     </p:extLst>
   </p:cSld>
@@ -13434,24 +13440,19 @@
           <a:p>
             <a:r>
               <a:rPr lang="en-US" dirty="0" smtClean="0"/>
-              <a:t>This idea</a:t>
+              <a:t>html and </a:t>
+            </a:r>
+            <a:r>
+              <a:rPr lang="en-US" dirty="0" err="1" smtClean="0"/>
+              <a:t>css</a:t>
+            </a:r>
+            <a:r>
+              <a:rPr lang="en-US" dirty="0" smtClean="0"/>
+              <a:t> are the “grammar” –</a:t>
             </a:r>
             <a:r>
               <a:rPr lang="en-US" baseline="0" dirty="0" smtClean="0"/>
-              <a:t> that PHP is only on the server is a very important </a:t>
-            </a:r>
-            <a:r>
-              <a:rPr lang="en-US" baseline="0" dirty="0" smtClean="0"/>
-              <a:t>idea</a:t>
-            </a:r>
-          </a:p>
-          <a:p>
-            <a:endParaRPr lang="en-US" baseline="0" dirty="0" smtClean="0"/>
-          </a:p>
-          <a:p>
-            <a:r>
-              <a:rPr lang="en-US" baseline="0" dirty="0" smtClean="0"/>
-              <a:t>Concept of “shared nothing” for PHP as well</a:t>
+              <a:t> a standard method of markup and display for data</a:t>
             </a:r>
             <a:endParaRPr lang="en-US" dirty="0"/>
           </a:p>
@@ -13483,7 +13484,7 @@
     </p:spTree>
     <p:extLst>
       <p:ext uri="{BB962C8B-B14F-4D97-AF65-F5344CB8AC3E}">
-        <p14:creationId xmlns:p14="http://schemas.microsoft.com/office/powerpoint/2010/main" val="592585489"/>
+        <p14:creationId xmlns:p14="http://schemas.microsoft.com/office/powerpoint/2010/main" val="505639497"/>
       </p:ext>
     </p:extLst>
   </p:cSld>
@@ -13537,6 +13538,23 @@
           <a:bodyPr/>
           <a:lstStyle/>
           <a:p>
+            <a:r>
+              <a:rPr lang="en-US" dirty="0" smtClean="0"/>
+              <a:t>This idea</a:t>
+            </a:r>
+            <a:r>
+              <a:rPr lang="en-US" baseline="0" dirty="0" smtClean="0"/>
+              <a:t> that PHP is only on the server is a very important idea</a:t>
+            </a:r>
+          </a:p>
+          <a:p>
+            <a:endParaRPr lang="en-US" baseline="0" dirty="0" smtClean="0"/>
+          </a:p>
+          <a:p>
+            <a:r>
+              <a:rPr lang="en-US" baseline="0" dirty="0" smtClean="0"/>
+              <a:t>Concept of “shared nothing” for PHP as well</a:t>
+            </a:r>
             <a:endParaRPr lang="en-US" dirty="0"/>
           </a:p>
         </p:txBody>
@@ -13558,7 +13576,7 @@
           <a:p>
             <a:fld id="{EE4E8135-7890-A04A-AF84-338B246EB862}" type="slidenum">
               <a:rPr lang="en-US" smtClean="0"/>
-              <a:t>19</a:t>
+              <a:t>18</a:t>
             </a:fld>
             <a:endParaRPr lang="en-US"/>
           </a:p>
@@ -13567,7 +13585,127 @@
     </p:spTree>
     <p:extLst>
       <p:ext uri="{BB962C8B-B14F-4D97-AF65-F5344CB8AC3E}">
-        <p14:creationId xmlns:p14="http://schemas.microsoft.com/office/powerpoint/2010/main" val="1884784651"/>
+        <p14:creationId xmlns:p14="http://schemas.microsoft.com/office/powerpoint/2010/main" val="592585489"/>
+      </p:ext>
+    </p:extLst>
+  </p:cSld>
+  <p:clrMapOvr>
+    <a:masterClrMapping/>
+  </p:clrMapOvr>
+</p:notes>
+</file>
+
+<file path=ppt/notesSlides/notesSlide19.xml><?xml version="1.0" encoding="utf-8"?>
+<p:notes xmlns:a="http://schemas.openxmlformats.org/drawingml/2006/main" xmlns:r="http://schemas.openxmlformats.org/officeDocument/2006/relationships" xmlns:p="http://schemas.openxmlformats.org/presentationml/2006/main">
+  <p:cSld>
+    <p:spTree>
+      <p:nvGrpSpPr>
+        <p:cNvPr id="1" name=""/>
+        <p:cNvGrpSpPr/>
+        <p:nvPr/>
+      </p:nvGrpSpPr>
+      <p:grpSpPr>
+        <a:xfrm>
+          <a:off x="0" y="0"/>
+          <a:ext cx="0" cy="0"/>
+          <a:chOff x="0" y="0"/>
+          <a:chExt cx="0" cy="0"/>
+        </a:xfrm>
+      </p:grpSpPr>
+      <p:sp>
+        <p:nvSpPr>
+          <p:cNvPr id="2" name="Slide Image Placeholder 1"/>
+          <p:cNvSpPr>
+            <a:spLocks noGrp="1" noRot="1" noChangeAspect="1"/>
+          </p:cNvSpPr>
+          <p:nvPr>
+            <p:ph type="sldImg"/>
+          </p:nvPr>
+        </p:nvSpPr>
+        <p:spPr/>
+      </p:sp>
+      <p:sp>
+        <p:nvSpPr>
+          <p:cNvPr id="3" name="Notes Placeholder 2"/>
+          <p:cNvSpPr>
+            <a:spLocks noGrp="1"/>
+          </p:cNvSpPr>
+          <p:nvPr>
+            <p:ph type="body" idx="1"/>
+          </p:nvPr>
+        </p:nvSpPr>
+        <p:spPr/>
+        <p:txBody>
+          <a:bodyPr/>
+          <a:lstStyle/>
+          <a:p>
+            <a:r>
+              <a:rPr lang="en-US" dirty="0" smtClean="0"/>
+              <a:t>Html, </a:t>
+            </a:r>
+            <a:r>
+              <a:rPr lang="en-US" dirty="0" err="1" smtClean="0"/>
+              <a:t>css</a:t>
+            </a:r>
+            <a:r>
+              <a:rPr lang="en-US" dirty="0" smtClean="0"/>
+              <a:t>, </a:t>
+            </a:r>
+            <a:r>
+              <a:rPr lang="en-US" dirty="0" err="1" smtClean="0"/>
+              <a:t>javascript</a:t>
+            </a:r>
+            <a:r>
+              <a:rPr lang="en-US" dirty="0" smtClean="0"/>
+              <a:t>, </a:t>
+            </a:r>
+            <a:r>
+              <a:rPr lang="en-US" dirty="0" err="1" smtClean="0"/>
+              <a:t>boostrap</a:t>
+            </a:r>
+            <a:r>
+              <a:rPr lang="en-US" baseline="0" dirty="0" smtClean="0"/>
+              <a:t> as </a:t>
+            </a:r>
+            <a:r>
+              <a:rPr lang="en-US" baseline="0" dirty="0" err="1" smtClean="0"/>
+              <a:t>css</a:t>
+            </a:r>
+            <a:r>
+              <a:rPr lang="en-US" baseline="0" dirty="0" smtClean="0"/>
+              <a:t> framework magic</a:t>
+            </a:r>
+            <a:endParaRPr lang="en-US" dirty="0"/>
+          </a:p>
+        </p:txBody>
+      </p:sp>
+      <p:sp>
+        <p:nvSpPr>
+          <p:cNvPr id="4" name="Slide Number Placeholder 3"/>
+          <p:cNvSpPr>
+            <a:spLocks noGrp="1"/>
+          </p:cNvSpPr>
+          <p:nvPr>
+            <p:ph type="sldNum" sz="quarter" idx="10"/>
+          </p:nvPr>
+        </p:nvSpPr>
+        <p:spPr/>
+        <p:txBody>
+          <a:bodyPr/>
+          <a:lstStyle/>
+          <a:p>
+            <a:fld id="{EE4E8135-7890-A04A-AF84-338B246EB862}" type="slidenum">
+              <a:rPr lang="en-US" smtClean="0"/>
+              <a:t>19</a:t>
+            </a:fld>
+            <a:endParaRPr lang="en-US"/>
+          </a:p>
+        </p:txBody>
+      </p:sp>
+    </p:spTree>
+    <p:extLst>
+      <p:ext uri="{BB962C8B-B14F-4D97-AF65-F5344CB8AC3E}">
+        <p14:creationId xmlns:p14="http://schemas.microsoft.com/office/powerpoint/2010/main" val="1134931336"/>
       </p:ext>
     </p:extLst>
   </p:cSld>
@@ -13623,42 +13761,19 @@
           <a:p>
             <a:r>
               <a:rPr lang="en-US" dirty="0" smtClean="0"/>
-              <a:t>Wait what? does that make sense?</a:t>
-            </a:r>
-          </a:p>
-          <a:p>
-            <a:r>
-              <a:rPr lang="en-US" dirty="0" smtClean="0"/>
-              <a:t>So any internet application – or</a:t>
+              <a:t>SO the internet is a bunch of acronym</a:t>
             </a:r>
             <a:r>
               <a:rPr lang="en-US" baseline="0" dirty="0" smtClean="0"/>
-              <a:t> intranet application has two things that makes it so</a:t>
-            </a:r>
-          </a:p>
-          <a:p>
-            <a:endParaRPr lang="en-US" baseline="0" dirty="0" smtClean="0"/>
+              <a:t> soup</a:t>
+            </a:r>
           </a:p>
           <a:p>
             <a:r>
               <a:rPr lang="en-US" baseline="0" dirty="0" smtClean="0"/>
-              <a:t>It speaks TCP/IP – and usually HTTP</a:t>
-            </a:r>
-          </a:p>
-          <a:p>
-            <a:r>
-              <a:rPr lang="en-US" baseline="0" dirty="0" smtClean="0"/>
-              <a:t>And it has interconnected computers</a:t>
-            </a:r>
-          </a:p>
-          <a:p>
-            <a:endParaRPr lang="en-US" baseline="0" dirty="0" smtClean="0"/>
-          </a:p>
-          <a:p>
-            <a:r>
-              <a:rPr lang="en-US" baseline="0" dirty="0" smtClean="0"/>
-              <a:t>So everything speaks the same language </a:t>
-            </a:r>
+              <a:t>You don't have to know EVERYTHING but it's great to have an idea of HOW The internet works</a:t>
+            </a:r>
+            <a:endParaRPr lang="en-US" dirty="0"/>
           </a:p>
         </p:txBody>
       </p:sp>
@@ -13688,7 +13803,462 @@
     </p:spTree>
     <p:extLst>
       <p:ext uri="{BB962C8B-B14F-4D97-AF65-F5344CB8AC3E}">
-        <p14:creationId xmlns:p14="http://schemas.microsoft.com/office/powerpoint/2010/main" val="3159812254"/>
+        <p14:creationId xmlns:p14="http://schemas.microsoft.com/office/powerpoint/2010/main" val="1537274074"/>
+      </p:ext>
+    </p:extLst>
+  </p:cSld>
+  <p:clrMapOvr>
+    <a:masterClrMapping/>
+  </p:clrMapOvr>
+</p:notes>
+</file>
+
+<file path=ppt/notesSlides/notesSlide20.xml><?xml version="1.0" encoding="utf-8"?>
+<p:notes xmlns:a="http://schemas.openxmlformats.org/drawingml/2006/main" xmlns:r="http://schemas.openxmlformats.org/officeDocument/2006/relationships" xmlns:p="http://schemas.openxmlformats.org/presentationml/2006/main">
+  <p:cSld>
+    <p:spTree>
+      <p:nvGrpSpPr>
+        <p:cNvPr id="1" name=""/>
+        <p:cNvGrpSpPr/>
+        <p:nvPr/>
+      </p:nvGrpSpPr>
+      <p:grpSpPr>
+        <a:xfrm>
+          <a:off x="0" y="0"/>
+          <a:ext cx="0" cy="0"/>
+          <a:chOff x="0" y="0"/>
+          <a:chExt cx="0" cy="0"/>
+        </a:xfrm>
+      </p:grpSpPr>
+      <p:sp>
+        <p:nvSpPr>
+          <p:cNvPr id="2" name="Slide Image Placeholder 1"/>
+          <p:cNvSpPr>
+            <a:spLocks noGrp="1" noRot="1" noChangeAspect="1"/>
+          </p:cNvSpPr>
+          <p:nvPr>
+            <p:ph type="sldImg"/>
+          </p:nvPr>
+        </p:nvSpPr>
+        <p:spPr/>
+      </p:sp>
+      <p:sp>
+        <p:nvSpPr>
+          <p:cNvPr id="3" name="Notes Placeholder 2"/>
+          <p:cNvSpPr>
+            <a:spLocks noGrp="1"/>
+          </p:cNvSpPr>
+          <p:nvPr>
+            <p:ph type="body" idx="1"/>
+          </p:nvPr>
+        </p:nvSpPr>
+        <p:spPr/>
+        <p:txBody>
+          <a:bodyPr/>
+          <a:lstStyle/>
+          <a:p>
+            <a:r>
+              <a:rPr lang="en-US" dirty="0" smtClean="0"/>
+              <a:t>how</a:t>
+            </a:r>
+            <a:r>
+              <a:rPr lang="en-US" baseline="0" dirty="0" smtClean="0"/>
+              <a:t> we send you around after you login/logout, post a form, etc.</a:t>
+            </a:r>
+            <a:endParaRPr lang="en-US" dirty="0"/>
+          </a:p>
+        </p:txBody>
+      </p:sp>
+      <p:sp>
+        <p:nvSpPr>
+          <p:cNvPr id="4" name="Slide Number Placeholder 3"/>
+          <p:cNvSpPr>
+            <a:spLocks noGrp="1"/>
+          </p:cNvSpPr>
+          <p:nvPr>
+            <p:ph type="sldNum" sz="quarter" idx="10"/>
+          </p:nvPr>
+        </p:nvSpPr>
+        <p:spPr/>
+        <p:txBody>
+          <a:bodyPr/>
+          <a:lstStyle/>
+          <a:p>
+            <a:fld id="{EE4E8135-7890-A04A-AF84-338B246EB862}" type="slidenum">
+              <a:rPr lang="en-US" smtClean="0"/>
+              <a:t>20</a:t>
+            </a:fld>
+            <a:endParaRPr lang="en-US"/>
+          </a:p>
+        </p:txBody>
+      </p:sp>
+    </p:spTree>
+    <p:extLst>
+      <p:ext uri="{BB962C8B-B14F-4D97-AF65-F5344CB8AC3E}">
+        <p14:creationId xmlns:p14="http://schemas.microsoft.com/office/powerpoint/2010/main" val="3610184917"/>
+      </p:ext>
+    </p:extLst>
+  </p:cSld>
+  <p:clrMapOvr>
+    <a:masterClrMapping/>
+  </p:clrMapOvr>
+</p:notes>
+</file>
+
+<file path=ppt/notesSlides/notesSlide21.xml><?xml version="1.0" encoding="utf-8"?>
+<p:notes xmlns:a="http://schemas.openxmlformats.org/drawingml/2006/main" xmlns:r="http://schemas.openxmlformats.org/officeDocument/2006/relationships" xmlns:p="http://schemas.openxmlformats.org/presentationml/2006/main">
+  <p:cSld>
+    <p:spTree>
+      <p:nvGrpSpPr>
+        <p:cNvPr id="1" name=""/>
+        <p:cNvGrpSpPr/>
+        <p:nvPr/>
+      </p:nvGrpSpPr>
+      <p:grpSpPr>
+        <a:xfrm>
+          <a:off x="0" y="0"/>
+          <a:ext cx="0" cy="0"/>
+          <a:chOff x="0" y="0"/>
+          <a:chExt cx="0" cy="0"/>
+        </a:xfrm>
+      </p:grpSpPr>
+      <p:sp>
+        <p:nvSpPr>
+          <p:cNvPr id="2" name="Slide Image Placeholder 1"/>
+          <p:cNvSpPr>
+            <a:spLocks noGrp="1" noRot="1" noChangeAspect="1"/>
+          </p:cNvSpPr>
+          <p:nvPr>
+            <p:ph type="sldImg"/>
+          </p:nvPr>
+        </p:nvSpPr>
+        <p:spPr/>
+      </p:sp>
+      <p:sp>
+        <p:nvSpPr>
+          <p:cNvPr id="3" name="Notes Placeholder 2"/>
+          <p:cNvSpPr>
+            <a:spLocks noGrp="1"/>
+          </p:cNvSpPr>
+          <p:nvPr>
+            <p:ph type="body" idx="1"/>
+          </p:nvPr>
+        </p:nvSpPr>
+        <p:spPr/>
+        <p:txBody>
+          <a:bodyPr/>
+          <a:lstStyle/>
+          <a:p>
+            <a:r>
+              <a:rPr lang="en-US" dirty="0" smtClean="0"/>
+              <a:t>Get, post, validation – for now data is just stored</a:t>
+            </a:r>
+            <a:r>
+              <a:rPr lang="en-US" baseline="0" dirty="0" smtClean="0"/>
+              <a:t> in arrays and/or thrown away</a:t>
+            </a:r>
+            <a:endParaRPr lang="en-US" dirty="0"/>
+          </a:p>
+        </p:txBody>
+      </p:sp>
+      <p:sp>
+        <p:nvSpPr>
+          <p:cNvPr id="4" name="Slide Number Placeholder 3"/>
+          <p:cNvSpPr>
+            <a:spLocks noGrp="1"/>
+          </p:cNvSpPr>
+          <p:nvPr>
+            <p:ph type="sldNum" sz="quarter" idx="10"/>
+          </p:nvPr>
+        </p:nvSpPr>
+        <p:spPr/>
+        <p:txBody>
+          <a:bodyPr/>
+          <a:lstStyle/>
+          <a:p>
+            <a:fld id="{EE4E8135-7890-A04A-AF84-338B246EB862}" type="slidenum">
+              <a:rPr lang="en-US" smtClean="0"/>
+              <a:t>21</a:t>
+            </a:fld>
+            <a:endParaRPr lang="en-US"/>
+          </a:p>
+        </p:txBody>
+      </p:sp>
+    </p:spTree>
+    <p:extLst>
+      <p:ext uri="{BB962C8B-B14F-4D97-AF65-F5344CB8AC3E}">
+        <p14:creationId xmlns:p14="http://schemas.microsoft.com/office/powerpoint/2010/main" val="3021338488"/>
+      </p:ext>
+    </p:extLst>
+  </p:cSld>
+  <p:clrMapOvr>
+    <a:masterClrMapping/>
+  </p:clrMapOvr>
+</p:notes>
+</file>
+
+<file path=ppt/notesSlides/notesSlide22.xml><?xml version="1.0" encoding="utf-8"?>
+<p:notes xmlns:a="http://schemas.openxmlformats.org/drawingml/2006/main" xmlns:r="http://schemas.openxmlformats.org/officeDocument/2006/relationships" xmlns:p="http://schemas.openxmlformats.org/presentationml/2006/main">
+  <p:cSld>
+    <p:spTree>
+      <p:nvGrpSpPr>
+        <p:cNvPr id="1" name=""/>
+        <p:cNvGrpSpPr/>
+        <p:nvPr/>
+      </p:nvGrpSpPr>
+      <p:grpSpPr>
+        <a:xfrm>
+          <a:off x="0" y="0"/>
+          <a:ext cx="0" cy="0"/>
+          <a:chOff x="0" y="0"/>
+          <a:chExt cx="0" cy="0"/>
+        </a:xfrm>
+      </p:grpSpPr>
+      <p:sp>
+        <p:nvSpPr>
+          <p:cNvPr id="2" name="Slide Image Placeholder 1"/>
+          <p:cNvSpPr>
+            <a:spLocks noGrp="1" noRot="1" noChangeAspect="1"/>
+          </p:cNvSpPr>
+          <p:nvPr>
+            <p:ph type="sldImg"/>
+          </p:nvPr>
+        </p:nvSpPr>
+        <p:spPr/>
+      </p:sp>
+      <p:sp>
+        <p:nvSpPr>
+          <p:cNvPr id="3" name="Notes Placeholder 2"/>
+          <p:cNvSpPr>
+            <a:spLocks noGrp="1"/>
+          </p:cNvSpPr>
+          <p:nvPr>
+            <p:ph type="body" idx="1"/>
+          </p:nvPr>
+        </p:nvSpPr>
+        <p:spPr/>
+        <p:txBody>
+          <a:bodyPr/>
+          <a:lstStyle/>
+          <a:p>
+            <a:endParaRPr lang="en-US" dirty="0"/>
+          </a:p>
+        </p:txBody>
+      </p:sp>
+      <p:sp>
+        <p:nvSpPr>
+          <p:cNvPr id="4" name="Slide Number Placeholder 3"/>
+          <p:cNvSpPr>
+            <a:spLocks noGrp="1"/>
+          </p:cNvSpPr>
+          <p:nvPr>
+            <p:ph type="sldNum" sz="quarter" idx="10"/>
+          </p:nvPr>
+        </p:nvSpPr>
+        <p:spPr/>
+        <p:txBody>
+          <a:bodyPr/>
+          <a:lstStyle/>
+          <a:p>
+            <a:fld id="{EE4E8135-7890-A04A-AF84-338B246EB862}" type="slidenum">
+              <a:rPr lang="en-US" smtClean="0"/>
+              <a:t>23</a:t>
+            </a:fld>
+            <a:endParaRPr lang="en-US"/>
+          </a:p>
+        </p:txBody>
+      </p:sp>
+    </p:spTree>
+    <p:extLst>
+      <p:ext uri="{BB962C8B-B14F-4D97-AF65-F5344CB8AC3E}">
+        <p14:creationId xmlns:p14="http://schemas.microsoft.com/office/powerpoint/2010/main" val="1884784651"/>
+      </p:ext>
+    </p:extLst>
+  </p:cSld>
+  <p:clrMapOvr>
+    <a:masterClrMapping/>
+  </p:clrMapOvr>
+</p:notes>
+</file>
+
+<file path=ppt/notesSlides/notesSlide23.xml><?xml version="1.0" encoding="utf-8"?>
+<p:notes xmlns:a="http://schemas.openxmlformats.org/drawingml/2006/main" xmlns:r="http://schemas.openxmlformats.org/officeDocument/2006/relationships" xmlns:p="http://schemas.openxmlformats.org/presentationml/2006/main">
+  <p:cSld>
+    <p:spTree>
+      <p:nvGrpSpPr>
+        <p:cNvPr id="1" name=""/>
+        <p:cNvGrpSpPr/>
+        <p:nvPr/>
+      </p:nvGrpSpPr>
+      <p:grpSpPr>
+        <a:xfrm>
+          <a:off x="0" y="0"/>
+          <a:ext cx="0" cy="0"/>
+          <a:chOff x="0" y="0"/>
+          <a:chExt cx="0" cy="0"/>
+        </a:xfrm>
+      </p:grpSpPr>
+      <p:sp>
+        <p:nvSpPr>
+          <p:cNvPr id="2" name="Slide Image Placeholder 1"/>
+          <p:cNvSpPr>
+            <a:spLocks noGrp="1" noRot="1" noChangeAspect="1"/>
+          </p:cNvSpPr>
+          <p:nvPr>
+            <p:ph type="sldImg"/>
+          </p:nvPr>
+        </p:nvSpPr>
+        <p:spPr/>
+      </p:sp>
+      <p:sp>
+        <p:nvSpPr>
+          <p:cNvPr id="3" name="Notes Placeholder 2"/>
+          <p:cNvSpPr>
+            <a:spLocks noGrp="1"/>
+          </p:cNvSpPr>
+          <p:nvPr>
+            <p:ph type="body" idx="1"/>
+          </p:nvPr>
+        </p:nvSpPr>
+        <p:spPr/>
+        <p:txBody>
+          <a:bodyPr/>
+          <a:lstStyle/>
+          <a:p>
+            <a:r>
+              <a:rPr lang="en-US" dirty="0" smtClean="0"/>
+              <a:t>starting</a:t>
+            </a:r>
+            <a:r>
+              <a:rPr lang="en-US" baseline="0" dirty="0" smtClean="0"/>
+              <a:t> a session</a:t>
+            </a:r>
+          </a:p>
+          <a:p>
+            <a:r>
+              <a:rPr lang="en-US" baseline="0" dirty="0" smtClean="0"/>
+              <a:t>doing a "login" by not really checking a username and password and setting a session variable</a:t>
+            </a:r>
+          </a:p>
+          <a:p>
+            <a:r>
+              <a:rPr lang="en-US" baseline="0" dirty="0" smtClean="0"/>
+              <a:t>unset a session variable to logout</a:t>
+            </a:r>
+          </a:p>
+        </p:txBody>
+      </p:sp>
+      <p:sp>
+        <p:nvSpPr>
+          <p:cNvPr id="4" name="Slide Number Placeholder 3"/>
+          <p:cNvSpPr>
+            <a:spLocks noGrp="1"/>
+          </p:cNvSpPr>
+          <p:nvPr>
+            <p:ph type="sldNum" sz="quarter" idx="10"/>
+          </p:nvPr>
+        </p:nvSpPr>
+        <p:spPr/>
+        <p:txBody>
+          <a:bodyPr/>
+          <a:lstStyle/>
+          <a:p>
+            <a:fld id="{EE4E8135-7890-A04A-AF84-338B246EB862}" type="slidenum">
+              <a:rPr lang="en-US" smtClean="0"/>
+              <a:t>24</a:t>
+            </a:fld>
+            <a:endParaRPr lang="en-US"/>
+          </a:p>
+        </p:txBody>
+      </p:sp>
+    </p:spTree>
+    <p:extLst>
+      <p:ext uri="{BB962C8B-B14F-4D97-AF65-F5344CB8AC3E}">
+        <p14:creationId xmlns:p14="http://schemas.microsoft.com/office/powerpoint/2010/main" val="2911184362"/>
+      </p:ext>
+    </p:extLst>
+  </p:cSld>
+  <p:clrMapOvr>
+    <a:masterClrMapping/>
+  </p:clrMapOvr>
+</p:notes>
+</file>
+
+<file path=ppt/notesSlides/notesSlide24.xml><?xml version="1.0" encoding="utf-8"?>
+<p:notes xmlns:a="http://schemas.openxmlformats.org/drawingml/2006/main" xmlns:r="http://schemas.openxmlformats.org/officeDocument/2006/relationships" xmlns:p="http://schemas.openxmlformats.org/presentationml/2006/main">
+  <p:cSld>
+    <p:spTree>
+      <p:nvGrpSpPr>
+        <p:cNvPr id="1" name=""/>
+        <p:cNvGrpSpPr/>
+        <p:nvPr/>
+      </p:nvGrpSpPr>
+      <p:grpSpPr>
+        <a:xfrm>
+          <a:off x="0" y="0"/>
+          <a:ext cx="0" cy="0"/>
+          <a:chOff x="0" y="0"/>
+          <a:chExt cx="0" cy="0"/>
+        </a:xfrm>
+      </p:grpSpPr>
+      <p:sp>
+        <p:nvSpPr>
+          <p:cNvPr id="2" name="Slide Image Placeholder 1"/>
+          <p:cNvSpPr>
+            <a:spLocks noGrp="1" noRot="1" noChangeAspect="1"/>
+          </p:cNvSpPr>
+          <p:nvPr>
+            <p:ph type="sldImg"/>
+          </p:nvPr>
+        </p:nvSpPr>
+        <p:spPr/>
+      </p:sp>
+      <p:sp>
+        <p:nvSpPr>
+          <p:cNvPr id="3" name="Notes Placeholder 2"/>
+          <p:cNvSpPr>
+            <a:spLocks noGrp="1"/>
+          </p:cNvSpPr>
+          <p:nvPr>
+            <p:ph type="body" idx="1"/>
+          </p:nvPr>
+        </p:nvSpPr>
+        <p:spPr/>
+        <p:txBody>
+          <a:bodyPr/>
+          <a:lstStyle/>
+          <a:p>
+            <a:endParaRPr lang="en-US" dirty="0"/>
+          </a:p>
+        </p:txBody>
+      </p:sp>
+      <p:sp>
+        <p:nvSpPr>
+          <p:cNvPr id="4" name="Slide Number Placeholder 3"/>
+          <p:cNvSpPr>
+            <a:spLocks noGrp="1"/>
+          </p:cNvSpPr>
+          <p:nvPr>
+            <p:ph type="sldNum" sz="quarter" idx="10"/>
+          </p:nvPr>
+        </p:nvSpPr>
+        <p:spPr/>
+        <p:txBody>
+          <a:bodyPr/>
+          <a:lstStyle/>
+          <a:p>
+            <a:fld id="{EE4E8135-7890-A04A-AF84-338B246EB862}" type="slidenum">
+              <a:rPr lang="en-US" smtClean="0"/>
+              <a:t>25</a:t>
+            </a:fld>
+            <a:endParaRPr lang="en-US"/>
+          </a:p>
+        </p:txBody>
+      </p:sp>
+    </p:spTree>
+    <p:extLst>
+      <p:ext uri="{BB962C8B-B14F-4D97-AF65-F5344CB8AC3E}">
+        <p14:creationId xmlns:p14="http://schemas.microsoft.com/office/powerpoint/2010/main" val="1738414191"/>
       </p:ext>
     </p:extLst>
   </p:cSld>
@@ -13744,17 +14314,41 @@
           <a:p>
             <a:r>
               <a:rPr lang="en-US" dirty="0" smtClean="0"/>
-              <a:t>We like</a:t>
+              <a:t>Wait what? does that make sense?</a:t>
+            </a:r>
+          </a:p>
+          <a:p>
+            <a:r>
+              <a:rPr lang="en-US" dirty="0" smtClean="0"/>
+              <a:t>So any internet application – or</a:t>
             </a:r>
             <a:r>
               <a:rPr lang="en-US" baseline="0" dirty="0" smtClean="0"/>
-              <a:t> acronyms </a:t>
-            </a:r>
+              <a:t> intranet application has two things that makes it so</a:t>
+            </a:r>
+          </a:p>
+          <a:p>
+            <a:endParaRPr lang="en-US" baseline="0" dirty="0" smtClean="0"/>
           </a:p>
           <a:p>
             <a:r>
               <a:rPr lang="en-US" baseline="0" dirty="0" smtClean="0"/>
-              <a:t>each of these things layer on top of each other to create the internet we use today</a:t>
+              <a:t>It speaks TCP/IP – and usually HTTP</a:t>
+            </a:r>
+          </a:p>
+          <a:p>
+            <a:r>
+              <a:rPr lang="en-US" baseline="0" dirty="0" smtClean="0"/>
+              <a:t>And it has interconnected computers</a:t>
+            </a:r>
+          </a:p>
+          <a:p>
+            <a:endParaRPr lang="en-US" baseline="0" dirty="0" smtClean="0"/>
+          </a:p>
+          <a:p>
+            <a:r>
+              <a:rPr lang="en-US" baseline="0" dirty="0" smtClean="0"/>
+              <a:t>So everything speaks the same language </a:t>
             </a:r>
           </a:p>
         </p:txBody>
@@ -13785,7 +14379,7 @@
     </p:spTree>
     <p:extLst>
       <p:ext uri="{BB962C8B-B14F-4D97-AF65-F5344CB8AC3E}">
-        <p14:creationId xmlns:p14="http://schemas.microsoft.com/office/powerpoint/2010/main" val="2454272451"/>
+        <p14:creationId xmlns:p14="http://schemas.microsoft.com/office/powerpoint/2010/main" val="3159812254"/>
       </p:ext>
     </p:extLst>
   </p:cSld>
@@ -13841,26 +14435,17 @@
           <a:p>
             <a:r>
               <a:rPr lang="en-US" dirty="0" smtClean="0"/>
-              <a:t>TCP/IP is the communications</a:t>
+              <a:t>We like</a:t>
             </a:r>
             <a:r>
               <a:rPr lang="en-US" baseline="0" dirty="0" smtClean="0"/>
-              <a:t> systems that allow computers to talk to each other</a:t>
+              <a:t> acronyms </a:t>
             </a:r>
           </a:p>
           <a:p>
             <a:r>
               <a:rPr lang="en-US" baseline="0" dirty="0" smtClean="0"/>
-              <a:t>all the computers use the same standard protocols</a:t>
-            </a:r>
-          </a:p>
-          <a:p>
-            <a:endParaRPr lang="en-US" baseline="0" dirty="0" smtClean="0"/>
-          </a:p>
-          <a:p>
-            <a:r>
-              <a:rPr lang="en-US" baseline="0" dirty="0" smtClean="0"/>
-              <a:t>TCP/IP is closer the idea “this is the alphabet we all use” than “this is the language we all use”</a:t>
+              <a:t>each of these things layer on top of each other to create the internet we use today</a:t>
             </a:r>
           </a:p>
         </p:txBody>
@@ -13891,7 +14476,7 @@
     </p:spTree>
     <p:extLst>
       <p:ext uri="{BB962C8B-B14F-4D97-AF65-F5344CB8AC3E}">
-        <p14:creationId xmlns:p14="http://schemas.microsoft.com/office/powerpoint/2010/main" val="2256940277"/>
+        <p14:creationId xmlns:p14="http://schemas.microsoft.com/office/powerpoint/2010/main" val="2454272451"/>
       </p:ext>
     </p:extLst>
   </p:cSld>
@@ -13947,25 +14532,27 @@
           <a:p>
             <a:r>
               <a:rPr lang="en-US" dirty="0" smtClean="0"/>
-              <a:t>This is similar to the pony express</a:t>
-            </a:r>
-          </a:p>
-          <a:p>
-            <a:r>
-              <a:rPr lang="en-US" dirty="0" smtClean="0"/>
-              <a:t>They</a:t>
+              <a:t>TCP/IP is the communications</a:t>
             </a:r>
             <a:r>
               <a:rPr lang="en-US" baseline="0" dirty="0" smtClean="0"/>
-              <a:t> restricted the size of packages to assure that their 12 riders could carry multiple pieces of mail</a:t>
+              <a:t> systems that allow computers to talk to each other</a:t>
             </a:r>
           </a:p>
           <a:p>
             <a:r>
               <a:rPr lang="en-US" baseline="0" dirty="0" smtClean="0"/>
-              <a:t>so people weren’t waiting 5 days or more for items to be sent because 1 person sent large items</a:t>
-            </a:r>
-            <a:endParaRPr lang="en-US" dirty="0"/>
+              <a:t>all the computers use the same standard protocols</a:t>
+            </a:r>
+          </a:p>
+          <a:p>
+            <a:endParaRPr lang="en-US" baseline="0" dirty="0" smtClean="0"/>
+          </a:p>
+          <a:p>
+            <a:r>
+              <a:rPr lang="en-US" baseline="0" dirty="0" smtClean="0"/>
+              <a:t>TCP/IP is closer the idea “this is the alphabet we all use” than “this is the language we all use”</a:t>
+            </a:r>
           </a:p>
         </p:txBody>
       </p:sp>
@@ -13995,7 +14582,7 @@
     </p:spTree>
     <p:extLst>
       <p:ext uri="{BB962C8B-B14F-4D97-AF65-F5344CB8AC3E}">
-        <p14:creationId xmlns:p14="http://schemas.microsoft.com/office/powerpoint/2010/main" val="2410330876"/>
+        <p14:creationId xmlns:p14="http://schemas.microsoft.com/office/powerpoint/2010/main" val="2256940277"/>
       </p:ext>
     </p:extLst>
   </p:cSld>
@@ -14051,20 +14638,24 @@
           <a:p>
             <a:r>
               <a:rPr lang="en-US" dirty="0" smtClean="0"/>
-              <a:t>This is similar to a smart businessman</a:t>
+              <a:t>This is similar to the pony express</a:t>
+            </a:r>
+          </a:p>
+          <a:p>
+            <a:r>
+              <a:rPr lang="en-US" dirty="0" smtClean="0"/>
+              <a:t>They</a:t>
             </a:r>
             <a:r>
               <a:rPr lang="en-US" baseline="0" dirty="0" smtClean="0"/>
-              <a:t> at the end of the pony express, who would break up things into packets the size that could be sent via pony express (20 pages or so)</a:t>
+              <a:t> restricted the size of packages to assure that their 12 riders could carry multiple pieces of mail</a:t>
             </a:r>
           </a:p>
           <a:p>
             <a:r>
               <a:rPr lang="en-US" baseline="0" dirty="0" smtClean="0"/>
-              <a:t>and reassembled them at the other end – optionally they’d sent receipts, and anything not acknowledged in 10 days was replaced</a:t>
-            </a:r>
-          </a:p>
-          <a:p>
+              <a:t>so people weren’t waiting 5 days or more for items to be sent because 1 person sent large items</a:t>
+            </a:r>
             <a:endParaRPr lang="en-US" dirty="0"/>
           </a:p>
         </p:txBody>
@@ -14095,7 +14686,7 @@
     </p:spTree>
     <p:extLst>
       <p:ext uri="{BB962C8B-B14F-4D97-AF65-F5344CB8AC3E}">
-        <p14:creationId xmlns:p14="http://schemas.microsoft.com/office/powerpoint/2010/main" val="598156508"/>
+        <p14:creationId xmlns:p14="http://schemas.microsoft.com/office/powerpoint/2010/main" val="2410330876"/>
       </p:ext>
     </p:extLst>
   </p:cSld>
@@ -14151,33 +14742,17 @@
           <a:p>
             <a:r>
               <a:rPr lang="en-US" dirty="0" smtClean="0"/>
-              <a:t>So</a:t>
+              <a:t>This is similar to a smart businessman</a:t>
             </a:r>
             <a:r>
               <a:rPr lang="en-US" baseline="0" dirty="0" smtClean="0"/>
-              <a:t> if </a:t>
-            </a:r>
-            <a:r>
-              <a:rPr lang="en-US" baseline="0" dirty="0" err="1" smtClean="0"/>
-              <a:t>tcp</a:t>
-            </a:r>
+              <a:t> at the end of the pony express, who would break up things into packets the size that could be sent via pony express (20 pages or so)</a:t>
+            </a:r>
+          </a:p>
+          <a:p>
             <a:r>
               <a:rPr lang="en-US" baseline="0" dirty="0" smtClean="0"/>
-              <a:t>/</a:t>
-            </a:r>
-            <a:r>
-              <a:rPr lang="en-US" baseline="0" dirty="0" err="1" smtClean="0"/>
-              <a:t>ip</a:t>
-            </a:r>
-            <a:r>
-              <a:rPr lang="en-US" baseline="0" dirty="0" smtClean="0"/>
-              <a:t> is the alphabet, this is our language</a:t>
-            </a:r>
-          </a:p>
-          <a:p>
-            <a:r>
-              <a:rPr lang="en-US" baseline="0" dirty="0" smtClean="0"/>
-              <a:t>our method of giving meaning to words</a:t>
+              <a:t>and reassembled them at the other end – optionally they’d sent receipts, and anything not acknowledged in 10 days was replaced</a:t>
             </a:r>
           </a:p>
           <a:p>
@@ -14211,7 +14786,7 @@
     </p:spTree>
     <p:extLst>
       <p:ext uri="{BB962C8B-B14F-4D97-AF65-F5344CB8AC3E}">
-        <p14:creationId xmlns:p14="http://schemas.microsoft.com/office/powerpoint/2010/main" val="4196261688"/>
+        <p14:creationId xmlns:p14="http://schemas.microsoft.com/office/powerpoint/2010/main" val="598156508"/>
       </p:ext>
     </p:extLst>
   </p:cSld>
@@ -14267,26 +14842,11 @@
           <a:p>
             <a:r>
               <a:rPr lang="en-US" dirty="0" smtClean="0"/>
-              <a:t>Your browser makes</a:t>
+              <a:t>So</a:t>
             </a:r>
             <a:r>
               <a:rPr lang="en-US" baseline="0" dirty="0" smtClean="0"/>
-              <a:t> a request to the server</a:t>
-            </a:r>
-          </a:p>
-          <a:p>
-            <a:r>
-              <a:rPr lang="en-US" baseline="0" dirty="0" smtClean="0"/>
-              <a:t>the server decides what to send, and sends the text response to the browser</a:t>
-            </a:r>
-          </a:p>
-          <a:p>
-            <a:endParaRPr lang="en-US" baseline="0" dirty="0" smtClean="0"/>
-          </a:p>
-          <a:p>
-            <a:r>
-              <a:rPr lang="en-US" baseline="0" dirty="0" smtClean="0"/>
-              <a:t>the transmission along the wires, from computer to computer – is governed by </a:t>
+              <a:t> if </a:t>
             </a:r>
             <a:r>
               <a:rPr lang="en-US" baseline="0" dirty="0" err="1" smtClean="0"/>
@@ -14300,13 +14860,18 @@
               <a:rPr lang="en-US" baseline="0" dirty="0" err="1" smtClean="0"/>
               <a:t>ip</a:t>
             </a:r>
-            <a:endParaRPr lang="en-US" baseline="0" dirty="0" smtClean="0"/>
-          </a:p>
-          <a:p>
             <a:r>
               <a:rPr lang="en-US" baseline="0" dirty="0" smtClean="0"/>
-              <a:t>but what is transmitted and how is controlled by http</a:t>
-            </a:r>
+              <a:t> is the alphabet, this is our language</a:t>
+            </a:r>
+          </a:p>
+          <a:p>
+            <a:r>
+              <a:rPr lang="en-US" baseline="0" dirty="0" smtClean="0"/>
+              <a:t>our method of giving meaning to words</a:t>
+            </a:r>
+          </a:p>
+          <a:p>
             <a:endParaRPr lang="en-US" dirty="0"/>
           </a:p>
         </p:txBody>
@@ -14337,7 +14902,7 @@
     </p:spTree>
     <p:extLst>
       <p:ext uri="{BB962C8B-B14F-4D97-AF65-F5344CB8AC3E}">
-        <p14:creationId xmlns:p14="http://schemas.microsoft.com/office/powerpoint/2010/main" val="1105646837"/>
+        <p14:creationId xmlns:p14="http://schemas.microsoft.com/office/powerpoint/2010/main" val="4196261688"/>
       </p:ext>
     </p:extLst>
   </p:cSld>
@@ -14391,7 +14956,49 @@
           <a:bodyPr/>
           <a:lstStyle/>
           <a:p>
-            <a:endParaRPr lang="en-US" dirty="0" smtClean="0"/>
+            <a:r>
+              <a:rPr lang="en-US" dirty="0" smtClean="0"/>
+              <a:t>Your browser makes</a:t>
+            </a:r>
+            <a:r>
+              <a:rPr lang="en-US" baseline="0" dirty="0" smtClean="0"/>
+              <a:t> a request to the server</a:t>
+            </a:r>
+          </a:p>
+          <a:p>
+            <a:r>
+              <a:rPr lang="en-US" baseline="0" dirty="0" smtClean="0"/>
+              <a:t>the server decides what to send, and sends the text response to the browser</a:t>
+            </a:r>
+          </a:p>
+          <a:p>
+            <a:endParaRPr lang="en-US" baseline="0" dirty="0" smtClean="0"/>
+          </a:p>
+          <a:p>
+            <a:r>
+              <a:rPr lang="en-US" baseline="0" dirty="0" smtClean="0"/>
+              <a:t>the transmission along the wires, from computer to computer – is governed by </a:t>
+            </a:r>
+            <a:r>
+              <a:rPr lang="en-US" baseline="0" dirty="0" err="1" smtClean="0"/>
+              <a:t>tcp</a:t>
+            </a:r>
+            <a:r>
+              <a:rPr lang="en-US" baseline="0" dirty="0" smtClean="0"/>
+              <a:t>/</a:t>
+            </a:r>
+            <a:r>
+              <a:rPr lang="en-US" baseline="0" dirty="0" err="1" smtClean="0"/>
+              <a:t>ip</a:t>
+            </a:r>
+            <a:endParaRPr lang="en-US" baseline="0" dirty="0" smtClean="0"/>
+          </a:p>
+          <a:p>
+            <a:r>
+              <a:rPr lang="en-US" baseline="0" dirty="0" smtClean="0"/>
+              <a:t>but what is transmitted and how is controlled by http</a:t>
+            </a:r>
+            <a:endParaRPr lang="en-US" dirty="0"/>
           </a:p>
         </p:txBody>
       </p:sp>
@@ -14421,7 +15028,7 @@
     </p:spTree>
     <p:extLst>
       <p:ext uri="{BB962C8B-B14F-4D97-AF65-F5344CB8AC3E}">
-        <p14:creationId xmlns:p14="http://schemas.microsoft.com/office/powerpoint/2010/main" val="3640464061"/>
+        <p14:creationId xmlns:p14="http://schemas.microsoft.com/office/powerpoint/2010/main" val="1105646837"/>
       </p:ext>
     </p:extLst>
   </p:cSld>
@@ -14612,7 +15219,7 @@
           <a:p>
             <a:fld id="{95984484-F26C-F84D-86AB-AAEC11CBFB2F}" type="datetimeFigureOut">
               <a:rPr lang="en-US" smtClean="0"/>
-              <a:t>3/28/15</a:t>
+              <a:t>4/13/2015</a:t>
             </a:fld>
             <a:endParaRPr lang="en-US"/>
           </a:p>
@@ -14782,7 +15389,7 @@
           <a:p>
             <a:fld id="{95984484-F26C-F84D-86AB-AAEC11CBFB2F}" type="datetimeFigureOut">
               <a:rPr lang="en-US" smtClean="0"/>
-              <a:t>3/28/15</a:t>
+              <a:t>4/13/2015</a:t>
             </a:fld>
             <a:endParaRPr lang="en-US"/>
           </a:p>
@@ -14962,7 +15569,7 @@
           <a:p>
             <a:fld id="{95984484-F26C-F84D-86AB-AAEC11CBFB2F}" type="datetimeFigureOut">
               <a:rPr lang="en-US" smtClean="0"/>
-              <a:t>3/28/15</a:t>
+              <a:t>4/13/2015</a:t>
             </a:fld>
             <a:endParaRPr lang="en-US"/>
           </a:p>
@@ -15132,7 +15739,7 @@
           <a:p>
             <a:fld id="{95984484-F26C-F84D-86AB-AAEC11CBFB2F}" type="datetimeFigureOut">
               <a:rPr lang="en-US" smtClean="0"/>
-              <a:t>3/28/15</a:t>
+              <a:t>4/13/2015</a:t>
             </a:fld>
             <a:endParaRPr lang="en-US"/>
           </a:p>
@@ -15378,7 +15985,7 @@
           <a:p>
             <a:fld id="{95984484-F26C-F84D-86AB-AAEC11CBFB2F}" type="datetimeFigureOut">
               <a:rPr lang="en-US" smtClean="0"/>
-              <a:t>3/28/15</a:t>
+              <a:t>4/13/2015</a:t>
             </a:fld>
             <a:endParaRPr lang="en-US"/>
           </a:p>
@@ -15666,7 +16273,7 @@
           <a:p>
             <a:fld id="{95984484-F26C-F84D-86AB-AAEC11CBFB2F}" type="datetimeFigureOut">
               <a:rPr lang="en-US" smtClean="0"/>
-              <a:t>3/28/15</a:t>
+              <a:t>4/13/2015</a:t>
             </a:fld>
             <a:endParaRPr lang="en-US"/>
           </a:p>
@@ -16088,7 +16695,7 @@
           <a:p>
             <a:fld id="{95984484-F26C-F84D-86AB-AAEC11CBFB2F}" type="datetimeFigureOut">
               <a:rPr lang="en-US" smtClean="0"/>
-              <a:t>3/28/15</a:t>
+              <a:t>4/13/2015</a:t>
             </a:fld>
             <a:endParaRPr lang="en-US"/>
           </a:p>
@@ -16206,7 +16813,7 @@
           <a:p>
             <a:fld id="{95984484-F26C-F84D-86AB-AAEC11CBFB2F}" type="datetimeFigureOut">
               <a:rPr lang="en-US" smtClean="0"/>
-              <a:t>3/28/15</a:t>
+              <a:t>4/13/2015</a:t>
             </a:fld>
             <a:endParaRPr lang="en-US"/>
           </a:p>
@@ -16301,7 +16908,7 @@
           <a:p>
             <a:fld id="{95984484-F26C-F84D-86AB-AAEC11CBFB2F}" type="datetimeFigureOut">
               <a:rPr lang="en-US" smtClean="0"/>
-              <a:t>3/28/15</a:t>
+              <a:t>4/13/2015</a:t>
             </a:fld>
             <a:endParaRPr lang="en-US"/>
           </a:p>
@@ -16578,7 +17185,7 @@
           <a:p>
             <a:fld id="{95984484-F26C-F84D-86AB-AAEC11CBFB2F}" type="datetimeFigureOut">
               <a:rPr lang="en-US" smtClean="0"/>
-              <a:t>3/28/15</a:t>
+              <a:t>4/13/2015</a:t>
             </a:fld>
             <a:endParaRPr lang="en-US"/>
           </a:p>
@@ -16831,7 +17438,7 @@
           <a:p>
             <a:fld id="{95984484-F26C-F84D-86AB-AAEC11CBFB2F}" type="datetimeFigureOut">
               <a:rPr lang="en-US" smtClean="0"/>
-              <a:t>3/28/15</a:t>
+              <a:t>4/13/2015</a:t>
             </a:fld>
             <a:endParaRPr lang="en-US"/>
           </a:p>
@@ -17044,7 +17651,7 @@
           <a:p>
             <a:fld id="{95984484-F26C-F84D-86AB-AAEC11CBFB2F}" type="datetimeFigureOut">
               <a:rPr lang="en-US" smtClean="0"/>
-              <a:t>3/28/15</a:t>
+              <a:t>4/13/2015</a:t>
             </a:fld>
             <a:endParaRPr lang="en-US"/>
           </a:p>
@@ -17475,10 +18082,112 @@
   <p:clrMapOvr>
     <a:masterClrMapping/>
   </p:clrMapOvr>
+  <p:timing>
+    <p:tnLst>
+      <p:par>
+        <p:cTn id="1" dur="indefinite" restart="never" nodeType="tmRoot"/>
+      </p:par>
+    </p:tnLst>
+  </p:timing>
 </p:sld>
 </file>
 
 <file path=ppt/slides/slide10.xml><?xml version="1.0" encoding="utf-8"?>
+<p:sld xmlns:a="http://schemas.openxmlformats.org/drawingml/2006/main" xmlns:r="http://schemas.openxmlformats.org/officeDocument/2006/relationships" xmlns:p="http://schemas.openxmlformats.org/presentationml/2006/main">
+  <p:cSld>
+    <p:spTree>
+      <p:nvGrpSpPr>
+        <p:cNvPr id="1" name=""/>
+        <p:cNvGrpSpPr/>
+        <p:nvPr/>
+      </p:nvGrpSpPr>
+      <p:grpSpPr>
+        <a:xfrm>
+          <a:off x="0" y="0"/>
+          <a:ext cx="0" cy="0"/>
+          <a:chOff x="0" y="0"/>
+          <a:chExt cx="0" cy="0"/>
+        </a:xfrm>
+      </p:grpSpPr>
+      <p:sp>
+        <p:nvSpPr>
+          <p:cNvPr id="2" name="Title 1"/>
+          <p:cNvSpPr>
+            <a:spLocks noGrp="1"/>
+          </p:cNvSpPr>
+          <p:nvPr>
+            <p:ph type="title"/>
+          </p:nvPr>
+        </p:nvSpPr>
+        <p:spPr/>
+        <p:txBody>
+          <a:bodyPr/>
+          <a:lstStyle/>
+          <a:p>
+            <a:r>
+              <a:rPr lang="en-US" dirty="0" smtClean="0"/>
+              <a:t>Features of HTTP</a:t>
+            </a:r>
+            <a:endParaRPr lang="en-US" dirty="0"/>
+          </a:p>
+        </p:txBody>
+      </p:sp>
+      <p:sp>
+        <p:nvSpPr>
+          <p:cNvPr id="3" name="Content Placeholder 2"/>
+          <p:cNvSpPr>
+            <a:spLocks noGrp="1"/>
+          </p:cNvSpPr>
+          <p:nvPr>
+            <p:ph idx="1"/>
+          </p:nvPr>
+        </p:nvSpPr>
+        <p:spPr/>
+        <p:txBody>
+          <a:bodyPr/>
+          <a:lstStyle/>
+          <a:p>
+            <a:r>
+              <a:rPr lang="en-US" dirty="0" smtClean="0"/>
+              <a:t>connectionless – make the request, then disconnect and wait for the server to talk back</a:t>
+            </a:r>
+          </a:p>
+          <a:p>
+            <a:r>
+              <a:rPr lang="en-US" dirty="0" smtClean="0"/>
+              <a:t>media independent – anything can be sent, as long as you attach the type of content being sent</a:t>
+            </a:r>
+          </a:p>
+          <a:p>
+            <a:r>
+              <a:rPr lang="en-US" dirty="0" smtClean="0"/>
+              <a:t>stateless – server and client only know about each other during the request, afterwards they forget it happened</a:t>
+            </a:r>
+            <a:endParaRPr lang="en-US" dirty="0"/>
+          </a:p>
+        </p:txBody>
+      </p:sp>
+    </p:spTree>
+    <p:extLst>
+      <p:ext uri="{BB962C8B-B14F-4D97-AF65-F5344CB8AC3E}">
+        <p14:creationId xmlns:p14="http://schemas.microsoft.com/office/powerpoint/2010/main" val="1860090848"/>
+      </p:ext>
+    </p:extLst>
+  </p:cSld>
+  <p:clrMapOvr>
+    <a:masterClrMapping/>
+  </p:clrMapOvr>
+  <p:timing>
+    <p:tnLst>
+      <p:par>
+        <p:cTn id="1" dur="indefinite" restart="never" nodeType="tmRoot"/>
+      </p:par>
+    </p:tnLst>
+  </p:timing>
+</p:sld>
+</file>
+
+<file path=ppt/slides/slide11.xml><?xml version="1.0" encoding="utf-8"?>
 <p:sld xmlns:a="http://schemas.openxmlformats.org/drawingml/2006/main" xmlns:r="http://schemas.openxmlformats.org/officeDocument/2006/relationships" xmlns:p="http://schemas.openxmlformats.org/presentationml/2006/main">
   <p:cSld>
     <p:spTree>
@@ -17553,203 +18262,13 @@
   <p:clrMapOvr>
     <a:masterClrMapping/>
   </p:clrMapOvr>
-</p:sld>
-</file>
-
-<file path=ppt/slides/slide11.xml><?xml version="1.0" encoding="utf-8"?>
-<p:sld xmlns:a="http://schemas.openxmlformats.org/drawingml/2006/main" xmlns:r="http://schemas.openxmlformats.org/officeDocument/2006/relationships" xmlns:p="http://schemas.openxmlformats.org/presentationml/2006/main">
-  <p:cSld>
-    <p:spTree>
-      <p:nvGrpSpPr>
-        <p:cNvPr id="1" name=""/>
-        <p:cNvGrpSpPr/>
-        <p:nvPr/>
-      </p:nvGrpSpPr>
-      <p:grpSpPr>
-        <a:xfrm>
-          <a:off x="0" y="0"/>
-          <a:ext cx="0" cy="0"/>
-          <a:chOff x="0" y="0"/>
-          <a:chExt cx="0" cy="0"/>
-        </a:xfrm>
-      </p:grpSpPr>
-      <p:sp>
-        <p:nvSpPr>
-          <p:cNvPr id="2" name="Title 1"/>
-          <p:cNvSpPr>
-            <a:spLocks noGrp="1"/>
-          </p:cNvSpPr>
-          <p:nvPr>
-            <p:ph type="title"/>
-          </p:nvPr>
-        </p:nvSpPr>
-        <p:spPr/>
-        <p:txBody>
-          <a:bodyPr/>
-          <a:lstStyle/>
-          <a:p>
-            <a:r>
-              <a:rPr lang="en-US" dirty="0" smtClean="0"/>
-              <a:t>An HTTP Request</a:t>
-            </a:r>
-            <a:endParaRPr lang="en-US" dirty="0"/>
-          </a:p>
-        </p:txBody>
-      </p:sp>
-      <p:sp>
-        <p:nvSpPr>
-          <p:cNvPr id="3" name="Content Placeholder 2"/>
-          <p:cNvSpPr>
-            <a:spLocks noGrp="1"/>
-          </p:cNvSpPr>
-          <p:nvPr>
-            <p:ph idx="1"/>
-          </p:nvPr>
-        </p:nvSpPr>
-        <p:spPr>
-          <a:xfrm>
-            <a:off x="457200" y="1600200"/>
-            <a:ext cx="8016258" cy="4525963"/>
-          </a:xfrm>
-          <a:solidFill>
-            <a:schemeClr val="bg1">
-              <a:lumMod val="95000"/>
-            </a:schemeClr>
-          </a:solidFill>
-          <a:ln>
-            <a:solidFill>
-              <a:schemeClr val="tx1"/>
-            </a:solidFill>
-          </a:ln>
-        </p:spPr>
-        <p:txBody>
-          <a:bodyPr>
-            <a:normAutofit/>
-          </a:bodyPr>
-          <a:lstStyle/>
-          <a:p>
-            <a:pPr marL="0" indent="0">
-              <a:buNone/>
-            </a:pPr>
-            <a:r>
-              <a:rPr lang="en-US" sz="2000" dirty="0" smtClean="0">
-                <a:latin typeface="Lucida Console"/>
-              </a:rPr>
-              <a:t>GET /</a:t>
-            </a:r>
-            <a:r>
-              <a:rPr lang="en-US" sz="2000" dirty="0" err="1" smtClean="0">
-                <a:latin typeface="Lucida Console"/>
-              </a:rPr>
-              <a:t>hello.htm</a:t>
-            </a:r>
-            <a:endParaRPr lang="en-US" sz="2000" dirty="0">
-              <a:latin typeface="Lucida Console"/>
-            </a:endParaRPr>
-          </a:p>
-          <a:p>
-            <a:pPr marL="0" indent="0">
-              <a:buNone/>
-            </a:pPr>
-            <a:r>
-              <a:rPr lang="en-US" sz="2000" dirty="0" smtClean="0">
-                <a:latin typeface="Lucida Console"/>
-              </a:rPr>
-              <a:t>HTTP/1.1</a:t>
-            </a:r>
-          </a:p>
-          <a:p>
-            <a:pPr marL="0" indent="0">
-              <a:buNone/>
-            </a:pPr>
-            <a:r>
-              <a:rPr lang="en-US" sz="2000" dirty="0" smtClean="0">
-                <a:latin typeface="Lucida Console"/>
-              </a:rPr>
-              <a:t>User-Agent: Mozilla/4.0 (compatible; MSIE5.01; Windows NT)</a:t>
-            </a:r>
-          </a:p>
-          <a:p>
-            <a:pPr marL="0" indent="0">
-              <a:buNone/>
-            </a:pPr>
-            <a:r>
-              <a:rPr lang="en-US" sz="2000" dirty="0" smtClean="0">
-                <a:latin typeface="Lucida Console"/>
-              </a:rPr>
-              <a:t>Host: </a:t>
-            </a:r>
-            <a:r>
-              <a:rPr lang="en-US" sz="2000" dirty="0" smtClean="0">
-                <a:latin typeface="Lucida Console"/>
-                <a:hlinkClick r:id="rId3"/>
-              </a:rPr>
-              <a:t>example.com</a:t>
-            </a:r>
-            <a:endParaRPr lang="en-US" sz="2000" dirty="0">
-              <a:latin typeface="Lucida Console"/>
-            </a:endParaRPr>
-          </a:p>
-          <a:p>
-            <a:pPr marL="0" indent="0">
-              <a:buNone/>
-            </a:pPr>
-            <a:r>
-              <a:rPr lang="en-US" sz="2000" dirty="0" smtClean="0">
-                <a:latin typeface="Lucida Console"/>
-              </a:rPr>
-              <a:t>Accept-Language: en-us</a:t>
-            </a:r>
-          </a:p>
-          <a:p>
-            <a:pPr marL="0" indent="0">
-              <a:buNone/>
-            </a:pPr>
-            <a:r>
-              <a:rPr lang="en-US" sz="2000" dirty="0" smtClean="0">
-                <a:latin typeface="Lucida Console"/>
-              </a:rPr>
-              <a:t>Accept-Encoding: </a:t>
-            </a:r>
-            <a:r>
-              <a:rPr lang="en-US" sz="2000" dirty="0" err="1" smtClean="0">
-                <a:latin typeface="Lucida Console"/>
-              </a:rPr>
-              <a:t>gzip</a:t>
-            </a:r>
-            <a:r>
-              <a:rPr lang="en-US" sz="2000" dirty="0" smtClean="0">
-                <a:latin typeface="Lucida Console"/>
-              </a:rPr>
-              <a:t>, deflate</a:t>
-            </a:r>
-          </a:p>
-          <a:p>
-            <a:pPr marL="0" indent="0">
-              <a:buNone/>
-            </a:pPr>
-            <a:r>
-              <a:rPr lang="en-US" sz="2000" dirty="0" smtClean="0">
-                <a:latin typeface="Lucida Console"/>
-              </a:rPr>
-              <a:t>Connection: Keep-Alive</a:t>
-            </a:r>
-            <a:endParaRPr lang="en-US" sz="2000" dirty="0">
-              <a:latin typeface="Lucida Console"/>
-            </a:endParaRPr>
-          </a:p>
-        </p:txBody>
-      </p:sp>
-    </p:spTree>
-    <p:extLst>
-      <p:ext uri="{BB962C8B-B14F-4D97-AF65-F5344CB8AC3E}">
-        <p14:creationId xmlns:p14="http://schemas.microsoft.com/office/powerpoint/2010/main" val="1839079837"/>
-      </p:ext>
-    </p:extLst>
-  </p:cSld>
-  <p:clrMapOvr>
-    <a:masterClrMapping/>
-  </p:clrMapOvr>
+  <p:timing>
+    <p:tnLst>
+      <p:par>
+        <p:cTn id="1" dur="indefinite" restart="never" nodeType="tmRoot"/>
+      </p:par>
+    </p:tnLst>
+  </p:timing>
 </p:sld>
 </file>
 
@@ -17787,7 +18306,7 @@
           <a:p>
             <a:r>
               <a:rPr lang="en-US" dirty="0" smtClean="0"/>
-              <a:t>An HTTP Response</a:t>
+              <a:t>An HTTP Request</a:t>
             </a:r>
             <a:endParaRPr lang="en-US" dirty="0"/>
           </a:p>
@@ -17821,7 +18340,7 @@
         </p:spPr>
         <p:txBody>
           <a:bodyPr>
-            <a:normAutofit lnSpcReduction="10000"/>
+            <a:normAutofit/>
           </a:bodyPr>
           <a:lstStyle/>
           <a:p>
@@ -17832,8 +18351,17 @@
               <a:rPr lang="en-US" sz="2000" dirty="0" smtClean="0">
                 <a:latin typeface="Lucida Console"/>
               </a:rPr>
-              <a:t>HTTP/1.1 200 OK</a:t>
-            </a:r>
+              <a:t>GET /</a:t>
+            </a:r>
+            <a:r>
+              <a:rPr lang="en-US" sz="2000" dirty="0" err="1" smtClean="0">
+                <a:latin typeface="Lucida Console"/>
+              </a:rPr>
+              <a:t>hello.htm</a:t>
+            </a:r>
+            <a:endParaRPr lang="en-US" sz="2000" dirty="0">
+              <a:latin typeface="Lucida Console"/>
+            </a:endParaRPr>
           </a:p>
           <a:p>
             <a:pPr marL="0" indent="0">
@@ -17843,7 +18371,7 @@
               <a:rPr lang="en-US" sz="2000" dirty="0" smtClean="0">
                 <a:latin typeface="Lucida Console"/>
               </a:rPr>
-              <a:t>Date: Mon, 27 Jul 2009 12:28:53 GMT</a:t>
+              <a:t>HTTP/1.1</a:t>
             </a:r>
           </a:p>
           <a:p>
@@ -17854,7 +18382,7 @@
               <a:rPr lang="en-US" sz="2000" dirty="0" smtClean="0">
                 <a:latin typeface="Lucida Console"/>
               </a:rPr>
-              <a:t>Server: Apache/2.2.14 (Win32)</a:t>
+              <a:t>User-Agent: Mozilla/4.0 (compatible; MSIE5.01; Windows NT)</a:t>
             </a:r>
           </a:p>
           <a:p>
@@ -17865,8 +18393,18 @@
               <a:rPr lang="en-US" sz="2000" dirty="0" smtClean="0">
                 <a:latin typeface="Lucida Console"/>
               </a:rPr>
-              <a:t>Last-Modified: Wed, 22 Jul 2009 19:15:56 GMT</a:t>
-            </a:r>
+              <a:t>Host: </a:t>
+            </a:r>
+            <a:r>
+              <a:rPr lang="en-US" sz="2000" dirty="0" smtClean="0">
+                <a:latin typeface="Lucida Console"/>
+                <a:hlinkClick r:id="rId3"/>
+              </a:rPr>
+              <a:t>example.com</a:t>
+            </a:r>
+            <a:endParaRPr lang="en-US" sz="2000" dirty="0">
+              <a:latin typeface="Lucida Console"/>
+            </a:endParaRPr>
           </a:p>
           <a:p>
             <a:pPr marL="0" indent="0">
@@ -17876,7 +18414,7 @@
               <a:rPr lang="en-US" sz="2000" dirty="0" smtClean="0">
                 <a:latin typeface="Lucida Console"/>
               </a:rPr>
-              <a:t>Content-Length: 88</a:t>
+              <a:t>Accept-Language: en-us</a:t>
             </a:r>
           </a:p>
           <a:p>
@@ -17887,7 +18425,19 @@
               <a:rPr lang="en-US" sz="2000" dirty="0" smtClean="0">
                 <a:latin typeface="Lucida Console"/>
               </a:rPr>
-              <a:t>Content-Type: text/html</a:t>
+              <a:t>Accept-Encoding: </a:t>
+            </a:r>
+            <a:r>
+              <a:rPr lang="en-US" sz="2000" dirty="0" err="1" smtClean="0">
+                <a:latin typeface="Lucida Console"/>
+              </a:rPr>
+              <a:t>gzip</a:t>
+            </a:r>
+            <a:r>
+              <a:rPr lang="en-US" sz="2000" dirty="0" smtClean="0">
+                <a:latin typeface="Lucida Console"/>
+              </a:rPr>
+              <a:t>, deflate</a:t>
             </a:r>
           </a:p>
           <a:p>
@@ -17898,70 +18448,7 @@
               <a:rPr lang="en-US" sz="2000" dirty="0" smtClean="0">
                 <a:latin typeface="Lucida Console"/>
               </a:rPr>
-              <a:t>Connection: Closed</a:t>
-            </a:r>
-          </a:p>
-          <a:p>
-            <a:pPr marL="0" indent="0">
-              <a:buNone/>
-            </a:pPr>
-            <a:endParaRPr lang="en-US" sz="2000" dirty="0" smtClean="0">
-              <a:latin typeface="Lucida Console"/>
-            </a:endParaRPr>
-          </a:p>
-          <a:p>
-            <a:pPr marL="0" indent="0">
-              <a:buNone/>
-            </a:pPr>
-            <a:r>
-              <a:rPr lang="en-US" sz="2000" dirty="0" smtClean="0">
-                <a:latin typeface="Lucida Console"/>
-              </a:rPr>
-              <a:t>&lt;html&gt;</a:t>
-            </a:r>
-          </a:p>
-          <a:p>
-            <a:pPr marL="0" indent="0">
-              <a:buNone/>
-            </a:pPr>
-            <a:r>
-              <a:rPr lang="en-US" sz="2000" dirty="0" smtClean="0">
-                <a:latin typeface="Lucida Console"/>
-              </a:rPr>
-              <a:t>&lt;body</a:t>
-            </a:r>
-          </a:p>
-          <a:p>
-            <a:pPr marL="0" indent="0">
-              <a:buNone/>
-            </a:pPr>
-            <a:r>
-              <a:rPr lang="en-US" sz="2000" dirty="0" smtClean="0">
-                <a:latin typeface="Lucida Console"/>
-              </a:rPr>
-              <a:t>&lt;h1&gt;Hello, World!&lt;/h1&gt;</a:t>
-            </a:r>
-          </a:p>
-          <a:p>
-            <a:pPr marL="0" indent="0">
-              <a:buNone/>
-            </a:pPr>
-            <a:r>
-              <a:rPr lang="en-US" sz="2000" dirty="0" smtClean="0">
-                <a:latin typeface="Lucida Console"/>
-              </a:rPr>
-              <a:t>&lt;/body&gt;</a:t>
-            </a:r>
-          </a:p>
-          <a:p>
-            <a:pPr marL="0" indent="0">
-              <a:buNone/>
-            </a:pPr>
-            <a:r>
-              <a:rPr lang="en-US" sz="2000" dirty="0" smtClean="0">
-                <a:latin typeface="Lucida Console"/>
-              </a:rPr>
-              <a:t>&lt;/html&gt;</a:t>
+              <a:t>Connection: Keep-Alive</a:t>
             </a:r>
             <a:endParaRPr lang="en-US" sz="2000" dirty="0">
               <a:latin typeface="Lucida Console"/>
@@ -17972,13 +18459,20 @@
     </p:spTree>
     <p:extLst>
       <p:ext uri="{BB962C8B-B14F-4D97-AF65-F5344CB8AC3E}">
-        <p14:creationId xmlns:p14="http://schemas.microsoft.com/office/powerpoint/2010/main" val="1432512637"/>
+        <p14:creationId xmlns:p14="http://schemas.microsoft.com/office/powerpoint/2010/main" val="1839079837"/>
       </p:ext>
     </p:extLst>
   </p:cSld>
   <p:clrMapOvr>
     <a:masterClrMapping/>
   </p:clrMapOvr>
+  <p:timing>
+    <p:tnLst>
+      <p:par>
+        <p:cTn id="1" dur="indefinite" restart="never" nodeType="tmRoot"/>
+      </p:par>
+    </p:tnLst>
+  </p:timing>
 </p:sld>
 </file>
 
@@ -18016,7 +18510,7 @@
           <a:p>
             <a:r>
               <a:rPr lang="en-US" dirty="0" smtClean="0"/>
-              <a:t>HTTP Verbs</a:t>
+              <a:t>An HTTP Response</a:t>
             </a:r>
             <a:endParaRPr lang="en-US" dirty="0"/>
           </a:p>
@@ -18032,77 +18526,189 @@
             <p:ph idx="1"/>
           </p:nvPr>
         </p:nvSpPr>
-        <p:spPr/>
+        <p:spPr>
+          <a:xfrm>
+            <a:off x="457200" y="1600200"/>
+            <a:ext cx="8016258" cy="4525963"/>
+          </a:xfrm>
+          <a:solidFill>
+            <a:schemeClr val="bg1">
+              <a:lumMod val="95000"/>
+            </a:schemeClr>
+          </a:solidFill>
+          <a:ln>
+            <a:solidFill>
+              <a:schemeClr val="tx1"/>
+            </a:solidFill>
+          </a:ln>
+        </p:spPr>
         <p:txBody>
           <a:bodyPr>
-            <a:normAutofit fontScale="92500" lnSpcReduction="10000"/>
+            <a:normAutofit lnSpcReduction="10000"/>
           </a:bodyPr>
           <a:lstStyle/>
           <a:p>
-            <a:r>
-              <a:rPr lang="en-US" dirty="0" smtClean="0"/>
-              <a:t>GET</a:t>
-            </a:r>
-          </a:p>
-          <a:p>
-            <a:r>
-              <a:rPr lang="en-US" dirty="0" smtClean="0"/>
-              <a:t>POST</a:t>
-            </a:r>
-          </a:p>
-          <a:p>
-            <a:r>
-              <a:rPr lang="en-US" dirty="0" smtClean="0"/>
-              <a:t>HEAD</a:t>
-            </a:r>
-          </a:p>
-          <a:p>
-            <a:r>
-              <a:rPr lang="en-US" dirty="0" smtClean="0"/>
-              <a:t>PUT</a:t>
-            </a:r>
-          </a:p>
-          <a:p>
-            <a:r>
-              <a:rPr lang="en-US" dirty="0" smtClean="0"/>
-              <a:t>DELETE</a:t>
-            </a:r>
-            <a:endParaRPr lang="en-US" dirty="0"/>
-          </a:p>
-          <a:p>
-            <a:r>
-              <a:rPr lang="en-US" dirty="0" smtClean="0"/>
-              <a:t>CONNECT</a:t>
-            </a:r>
-          </a:p>
-          <a:p>
-            <a:r>
-              <a:rPr lang="en-US" dirty="0" smtClean="0"/>
-              <a:t>OPTIONS</a:t>
-            </a:r>
-          </a:p>
-          <a:p>
-            <a:r>
-              <a:rPr lang="en-US" dirty="0" smtClean="0"/>
-              <a:t>TRACE</a:t>
-            </a:r>
-            <a:br>
-              <a:rPr lang="en-US" dirty="0" smtClean="0"/>
-            </a:br>
-            <a:endParaRPr lang="en-US" dirty="0"/>
+            <a:pPr marL="0" indent="0">
+              <a:buNone/>
+            </a:pPr>
+            <a:r>
+              <a:rPr lang="en-US" sz="2000" dirty="0" smtClean="0">
+                <a:latin typeface="Lucida Console"/>
+              </a:rPr>
+              <a:t>HTTP/1.1 200 OK</a:t>
+            </a:r>
+          </a:p>
+          <a:p>
+            <a:pPr marL="0" indent="0">
+              <a:buNone/>
+            </a:pPr>
+            <a:r>
+              <a:rPr lang="en-US" sz="2000" dirty="0" smtClean="0">
+                <a:latin typeface="Lucida Console"/>
+              </a:rPr>
+              <a:t>Date: Mon, 27 Jul 2009 12:28:53 GMT</a:t>
+            </a:r>
+          </a:p>
+          <a:p>
+            <a:pPr marL="0" indent="0">
+              <a:buNone/>
+            </a:pPr>
+            <a:r>
+              <a:rPr lang="en-US" sz="2000" dirty="0" smtClean="0">
+                <a:latin typeface="Lucida Console"/>
+              </a:rPr>
+              <a:t>Server: Apache/2.2.14 (Win32)</a:t>
+            </a:r>
+          </a:p>
+          <a:p>
+            <a:pPr marL="0" indent="0">
+              <a:buNone/>
+            </a:pPr>
+            <a:r>
+              <a:rPr lang="en-US" sz="2000" dirty="0" smtClean="0">
+                <a:latin typeface="Lucida Console"/>
+              </a:rPr>
+              <a:t>Last-Modified: Wed, 22 Jul 2009 19:15:56 GMT</a:t>
+            </a:r>
+          </a:p>
+          <a:p>
+            <a:pPr marL="0" indent="0">
+              <a:buNone/>
+            </a:pPr>
+            <a:r>
+              <a:rPr lang="en-US" sz="2000" dirty="0" smtClean="0">
+                <a:latin typeface="Lucida Console"/>
+              </a:rPr>
+              <a:t>Content-Length: 88</a:t>
+            </a:r>
+          </a:p>
+          <a:p>
+            <a:pPr marL="0" indent="0">
+              <a:buNone/>
+            </a:pPr>
+            <a:r>
+              <a:rPr lang="en-US" sz="2000" dirty="0" smtClean="0">
+                <a:latin typeface="Lucida Console"/>
+              </a:rPr>
+              <a:t>Content-Type: text/html</a:t>
+            </a:r>
+          </a:p>
+          <a:p>
+            <a:pPr marL="0" indent="0">
+              <a:buNone/>
+            </a:pPr>
+            <a:r>
+              <a:rPr lang="en-US" sz="2000" dirty="0" smtClean="0">
+                <a:latin typeface="Lucida Console"/>
+              </a:rPr>
+              <a:t>Connection: Closed</a:t>
+            </a:r>
+          </a:p>
+          <a:p>
+            <a:pPr marL="0" indent="0">
+              <a:buNone/>
+            </a:pPr>
+            <a:endParaRPr lang="en-US" sz="2000" dirty="0" smtClean="0">
+              <a:latin typeface="Lucida Console"/>
+            </a:endParaRPr>
+          </a:p>
+          <a:p>
+            <a:pPr marL="0" indent="0">
+              <a:buNone/>
+            </a:pPr>
+            <a:r>
+              <a:rPr lang="en-US" sz="2000" dirty="0" smtClean="0">
+                <a:latin typeface="Lucida Console"/>
+              </a:rPr>
+              <a:t>&lt;html&gt;</a:t>
+            </a:r>
+          </a:p>
+          <a:p>
+            <a:pPr marL="0" indent="0">
+              <a:buNone/>
+            </a:pPr>
+            <a:r>
+              <a:rPr lang="en-US" sz="2000" dirty="0" smtClean="0">
+                <a:latin typeface="Lucida Console"/>
+              </a:rPr>
+              <a:t>&lt;body</a:t>
+            </a:r>
+          </a:p>
+          <a:p>
+            <a:pPr marL="0" indent="0">
+              <a:buNone/>
+            </a:pPr>
+            <a:r>
+              <a:rPr lang="en-US" sz="2000" dirty="0" smtClean="0">
+                <a:latin typeface="Lucida Console"/>
+              </a:rPr>
+              <a:t>&lt;h1&gt;Hello, World!&lt;/h1&gt;</a:t>
+            </a:r>
+          </a:p>
+          <a:p>
+            <a:pPr marL="0" indent="0">
+              <a:buNone/>
+            </a:pPr>
+            <a:r>
+              <a:rPr lang="en-US" sz="2000" dirty="0" smtClean="0">
+                <a:latin typeface="Lucida Console"/>
+              </a:rPr>
+              <a:t>&lt;/body&gt;</a:t>
+            </a:r>
+          </a:p>
+          <a:p>
+            <a:pPr marL="0" indent="0">
+              <a:buNone/>
+            </a:pPr>
+            <a:r>
+              <a:rPr lang="en-US" sz="2000" dirty="0" smtClean="0">
+                <a:latin typeface="Lucida Console"/>
+              </a:rPr>
+              <a:t>&lt;/html&gt;</a:t>
+            </a:r>
+            <a:endParaRPr lang="en-US" sz="2000" dirty="0">
+              <a:latin typeface="Lucida Console"/>
+            </a:endParaRPr>
           </a:p>
         </p:txBody>
       </p:sp>
     </p:spTree>
     <p:extLst>
       <p:ext uri="{BB962C8B-B14F-4D97-AF65-F5344CB8AC3E}">
-        <p14:creationId xmlns:p14="http://schemas.microsoft.com/office/powerpoint/2010/main" val="4100192742"/>
+        <p14:creationId xmlns:p14="http://schemas.microsoft.com/office/powerpoint/2010/main" val="1432512637"/>
       </p:ext>
     </p:extLst>
   </p:cSld>
   <p:clrMapOvr>
     <a:masterClrMapping/>
   </p:clrMapOvr>
+  <p:timing>
+    <p:tnLst>
+      <p:par>
+        <p:cTn id="1" dur="indefinite" restart="never" nodeType="tmRoot"/>
+      </p:par>
+    </p:tnLst>
+  </p:timing>
 </p:sld>
 </file>
 
@@ -18140,7 +18746,7 @@
           <a:p>
             <a:r>
               <a:rPr lang="en-US" dirty="0" smtClean="0"/>
-              <a:t>HTTP RESPONSES</a:t>
+              <a:t>HTTP Verbs</a:t>
             </a:r>
             <a:endParaRPr lang="en-US" dirty="0"/>
           </a:p>
@@ -18159,75 +18765,60 @@
         <p:spPr/>
         <p:txBody>
           <a:bodyPr>
-            <a:normAutofit fontScale="70000" lnSpcReduction="20000"/>
+            <a:normAutofit fontScale="92500" lnSpcReduction="10000"/>
           </a:bodyPr>
           <a:lstStyle/>
           <a:p>
             <a:r>
-              <a:rPr lang="en-US" b="1" dirty="0" smtClean="0"/>
-              <a:t>1xx: Informational</a:t>
-            </a:r>
-          </a:p>
-          <a:p>
-            <a:pPr lvl="1"/>
-            <a:r>
               <a:rPr lang="en-US" dirty="0" smtClean="0"/>
-              <a:t>It means the request has been received and the process is continuing.</a:t>
-            </a:r>
-          </a:p>
-          <a:p>
-            <a:r>
-              <a:rPr lang="en-US" b="1" dirty="0" smtClean="0"/>
-              <a:t>2xx: Success</a:t>
-            </a:r>
-          </a:p>
-          <a:p>
-            <a:pPr lvl="1"/>
+              <a:t>GET</a:t>
+            </a:r>
+          </a:p>
+          <a:p>
             <a:r>
               <a:rPr lang="en-US" dirty="0" smtClean="0"/>
-              <a:t>It means the action was successfully received, understood, and accepted.</a:t>
-            </a:r>
-          </a:p>
-          <a:p>
-            <a:r>
-              <a:rPr lang="en-US" b="1" dirty="0" smtClean="0"/>
-              <a:t>3xx: Redirection</a:t>
-            </a:r>
-          </a:p>
-          <a:p>
-            <a:pPr lvl="1"/>
+              <a:t>POST</a:t>
+            </a:r>
+          </a:p>
+          <a:p>
             <a:r>
               <a:rPr lang="en-US" dirty="0" smtClean="0"/>
-              <a:t>It means further action must be taken in order to complete the request.</a:t>
-            </a:r>
-          </a:p>
-          <a:p>
-            <a:r>
-              <a:rPr lang="en-US" b="1" dirty="0" smtClean="0"/>
-              <a:t>4xx: Client Error</a:t>
-            </a:r>
-          </a:p>
-          <a:p>
-            <a:pPr lvl="1"/>
+              <a:t>HEAD</a:t>
+            </a:r>
+          </a:p>
+          <a:p>
             <a:r>
               <a:rPr lang="en-US" dirty="0" smtClean="0"/>
-              <a:t>It means the request contains incorrect syntax or cannot be fulfilled.</a:t>
-            </a:r>
-          </a:p>
-          <a:p>
-            <a:r>
-              <a:rPr lang="en-US" b="1" dirty="0" smtClean="0"/>
-              <a:t>5xx: Server Error</a:t>
-            </a:r>
-          </a:p>
-          <a:p>
-            <a:pPr lvl="1"/>
+              <a:t>PUT</a:t>
+            </a:r>
+          </a:p>
+          <a:p>
             <a:r>
               <a:rPr lang="en-US" dirty="0" smtClean="0"/>
-              <a:t>It means the server failed to fulfill an apparently valid request.</a:t>
-            </a:r>
-          </a:p>
-          <a:p>
+              <a:t>DELETE</a:t>
+            </a:r>
+            <a:endParaRPr lang="en-US" dirty="0"/>
+          </a:p>
+          <a:p>
+            <a:r>
+              <a:rPr lang="en-US" dirty="0" smtClean="0"/>
+              <a:t>CONNECT</a:t>
+            </a:r>
+          </a:p>
+          <a:p>
+            <a:r>
+              <a:rPr lang="en-US" dirty="0" smtClean="0"/>
+              <a:t>OPTIONS</a:t>
+            </a:r>
+          </a:p>
+          <a:p>
+            <a:r>
+              <a:rPr lang="en-US" dirty="0" smtClean="0"/>
+              <a:t>TRACE</a:t>
+            </a:r>
+            <a:br>
+              <a:rPr lang="en-US" dirty="0" smtClean="0"/>
+            </a:br>
             <a:endParaRPr lang="en-US" dirty="0"/>
           </a:p>
         </p:txBody>
@@ -18235,13 +18826,20 @@
     </p:spTree>
     <p:extLst>
       <p:ext uri="{BB962C8B-B14F-4D97-AF65-F5344CB8AC3E}">
-        <p14:creationId xmlns:p14="http://schemas.microsoft.com/office/powerpoint/2010/main" val="3643861209"/>
+        <p14:creationId xmlns:p14="http://schemas.microsoft.com/office/powerpoint/2010/main" val="4100192742"/>
       </p:ext>
     </p:extLst>
   </p:cSld>
   <p:clrMapOvr>
     <a:masterClrMapping/>
   </p:clrMapOvr>
+  <p:timing>
+    <p:tnLst>
+      <p:par>
+        <p:cTn id="1" dur="indefinite" restart="never" nodeType="tmRoot"/>
+      </p:par>
+    </p:tnLst>
+  </p:timing>
 </p:sld>
 </file>
 
@@ -18279,7 +18877,7 @@
           <a:p>
             <a:r>
               <a:rPr lang="en-US" dirty="0" smtClean="0"/>
-              <a:t>Clients</a:t>
+              <a:t>HTTP RESPONSES</a:t>
             </a:r>
             <a:endParaRPr lang="en-US" dirty="0"/>
           </a:p>
@@ -18298,69 +18896,75 @@
         <p:spPr/>
         <p:txBody>
           <a:bodyPr>
-            <a:normAutofit lnSpcReduction="10000"/>
+            <a:normAutofit fontScale="70000" lnSpcReduction="20000"/>
           </a:bodyPr>
           <a:lstStyle/>
           <a:p>
             <a:r>
+              <a:rPr lang="en-US" b="1" dirty="0" smtClean="0"/>
+              <a:t>1xx: Informational</a:t>
+            </a:r>
+          </a:p>
+          <a:p>
+            <a:pPr lvl="1"/>
+            <a:r>
               <a:rPr lang="en-US" dirty="0" smtClean="0"/>
-              <a:t>Your browser</a:t>
+              <a:t>It means the request has been received and the process is continuing.</a:t>
+            </a:r>
+          </a:p>
+          <a:p>
+            <a:r>
+              <a:rPr lang="en-US" b="1" dirty="0" smtClean="0"/>
+              <a:t>2xx: Success</a:t>
             </a:r>
           </a:p>
           <a:p>
             <a:pPr lvl="1"/>
             <a:r>
               <a:rPr lang="en-US" dirty="0" smtClean="0"/>
-              <a:t>safari</a:t>
+              <a:t>It means the action was successfully received, understood, and accepted.</a:t>
+            </a:r>
+          </a:p>
+          <a:p>
+            <a:r>
+              <a:rPr lang="en-US" b="1" dirty="0" smtClean="0"/>
+              <a:t>3xx: Redirection</a:t>
             </a:r>
           </a:p>
           <a:p>
             <a:pPr lvl="1"/>
             <a:r>
               <a:rPr lang="en-US" dirty="0" smtClean="0"/>
-              <a:t>chrome</a:t>
+              <a:t>It means further action must be taken in order to complete the request.</a:t>
+            </a:r>
+          </a:p>
+          <a:p>
+            <a:r>
+              <a:rPr lang="en-US" b="1" dirty="0" smtClean="0"/>
+              <a:t>4xx: Client Error</a:t>
             </a:r>
           </a:p>
           <a:p>
             <a:pPr lvl="1"/>
             <a:r>
-              <a:rPr lang="en-US" dirty="0" err="1" smtClean="0"/>
-              <a:t>firefox</a:t>
-            </a:r>
-            <a:endParaRPr lang="en-US" dirty="0" smtClean="0"/>
+              <a:rPr lang="en-US" dirty="0" smtClean="0"/>
+              <a:t>It means the request contains incorrect syntax or cannot be fulfilled.</a:t>
+            </a:r>
+          </a:p>
+          <a:p>
+            <a:r>
+              <a:rPr lang="en-US" b="1" dirty="0" smtClean="0"/>
+              <a:t>5xx: Server Error</a:t>
+            </a:r>
           </a:p>
           <a:p>
             <a:pPr lvl="1"/>
             <a:r>
               <a:rPr lang="en-US" dirty="0" smtClean="0"/>
-              <a:t>IE</a:t>
-            </a:r>
-          </a:p>
-          <a:p>
-            <a:r>
-              <a:rPr lang="en-US" dirty="0" smtClean="0"/>
-              <a:t>Tools</a:t>
-            </a:r>
-          </a:p>
-          <a:p>
-            <a:pPr lvl="1"/>
-            <a:r>
-              <a:rPr lang="en-US" dirty="0" smtClean="0"/>
-              <a:t>curl</a:t>
-            </a:r>
-          </a:p>
-          <a:p>
-            <a:r>
-              <a:rPr lang="en-US" dirty="0" smtClean="0"/>
-              <a:t>Programs</a:t>
-            </a:r>
-          </a:p>
-          <a:p>
-            <a:pPr lvl="1"/>
-            <a:r>
-              <a:rPr lang="en-US" dirty="0" smtClean="0"/>
-              <a:t>requesting via code</a:t>
-            </a:r>
+              <a:t>It means the server failed to fulfill an apparently valid request.</a:t>
+            </a:r>
+          </a:p>
+          <a:p>
             <a:endParaRPr lang="en-US" dirty="0"/>
           </a:p>
         </p:txBody>
@@ -18368,13 +18972,20 @@
     </p:spTree>
     <p:extLst>
       <p:ext uri="{BB962C8B-B14F-4D97-AF65-F5344CB8AC3E}">
-        <p14:creationId xmlns:p14="http://schemas.microsoft.com/office/powerpoint/2010/main" val="4157348533"/>
+        <p14:creationId xmlns:p14="http://schemas.microsoft.com/office/powerpoint/2010/main" val="3643861209"/>
       </p:ext>
     </p:extLst>
   </p:cSld>
   <p:clrMapOvr>
     <a:masterClrMapping/>
   </p:clrMapOvr>
+  <p:timing>
+    <p:tnLst>
+      <p:par>
+        <p:cTn id="1" dur="indefinite" restart="never" nodeType="tmRoot"/>
+      </p:par>
+    </p:tnLst>
+  </p:timing>
 </p:sld>
 </file>
 
@@ -18407,29 +19018,12 @@
         </p:nvSpPr>
         <p:spPr/>
         <p:txBody>
-          <a:bodyPr>
-            <a:normAutofit fontScale="90000"/>
-          </a:bodyPr>
+          <a:bodyPr/>
           <a:lstStyle/>
           <a:p>
             <a:r>
               <a:rPr lang="en-US" dirty="0" smtClean="0"/>
-              <a:t>HTML and CSS</a:t>
-            </a:r>
-            <a:br>
-              <a:rPr lang="en-US" dirty="0" smtClean="0"/>
-            </a:br>
-            <a:r>
-              <a:rPr lang="en-US" dirty="0" smtClean="0"/>
-              <a:t>(and </a:t>
-            </a:r>
-            <a:r>
-              <a:rPr lang="en-US" dirty="0" err="1" smtClean="0"/>
-              <a:t>javascript</a:t>
-            </a:r>
-            <a:r>
-              <a:rPr lang="en-US" dirty="0" smtClean="0"/>
-              <a:t>)</a:t>
+              <a:t>Clients</a:t>
             </a:r>
             <a:endParaRPr lang="en-US" dirty="0"/>
           </a:p>
@@ -18447,58 +19041,69 @@
         </p:nvSpPr>
         <p:spPr/>
         <p:txBody>
-          <a:bodyPr/>
+          <a:bodyPr>
+            <a:normAutofit lnSpcReduction="10000"/>
+          </a:bodyPr>
           <a:lstStyle/>
           <a:p>
             <a:r>
-              <a:rPr lang="en-US" b="1" dirty="0" smtClean="0"/>
-              <a:t>HTML</a:t>
-            </a:r>
-            <a:r>
               <a:rPr lang="en-US" dirty="0" smtClean="0"/>
-              <a:t> (the Hypertext Markup Language) and </a:t>
-            </a:r>
-            <a:r>
-              <a:rPr lang="en-US" b="1" dirty="0" smtClean="0"/>
-              <a:t>CSS</a:t>
-            </a:r>
+              <a:t>Your browser</a:t>
+            </a:r>
+          </a:p>
+          <a:p>
+            <a:pPr lvl="1"/>
             <a:r>
               <a:rPr lang="en-US" dirty="0" smtClean="0"/>
-              <a:t> (</a:t>
-            </a:r>
-            <a:r>
-              <a:rPr lang="en-US" b="1" dirty="0" smtClean="0"/>
-              <a:t>Cascading Style Sheets</a:t>
-            </a:r>
+              <a:t>safari</a:t>
+            </a:r>
+          </a:p>
+          <a:p>
+            <a:pPr lvl="1"/>
             <a:r>
               <a:rPr lang="en-US" dirty="0" smtClean="0"/>
-              <a:t>) are two of the core technologies for building Web pages. </a:t>
-            </a:r>
-            <a:r>
-              <a:rPr lang="en-US" b="1" dirty="0" smtClean="0"/>
-              <a:t>HTML</a:t>
-            </a:r>
+              <a:t>chrome</a:t>
+            </a:r>
+          </a:p>
+          <a:p>
+            <a:pPr lvl="1"/>
+            <a:r>
+              <a:rPr lang="en-US" dirty="0" err="1" smtClean="0"/>
+              <a:t>firefox</a:t>
+            </a:r>
+            <a:endParaRPr lang="en-US" dirty="0" smtClean="0"/>
+          </a:p>
+          <a:p>
+            <a:pPr lvl="1"/>
             <a:r>
               <a:rPr lang="en-US" dirty="0" smtClean="0"/>
-              <a:t> provides the structure of the page, </a:t>
-            </a:r>
-            <a:r>
-              <a:rPr lang="en-US" b="1" dirty="0" smtClean="0"/>
-              <a:t>CSS</a:t>
-            </a:r>
+              <a:t>IE</a:t>
+            </a:r>
+          </a:p>
+          <a:p>
             <a:r>
               <a:rPr lang="en-US" dirty="0" smtClean="0"/>
-              <a:t> the (visual and aural) layout, for a variety of devices</a:t>
-            </a:r>
-          </a:p>
-          <a:p>
-            <a:r>
-              <a:rPr lang="en-US" dirty="0" err="1" smtClean="0"/>
-              <a:t>Javascript</a:t>
-            </a:r>
+              <a:t>Tools</a:t>
+            </a:r>
+          </a:p>
+          <a:p>
+            <a:pPr lvl="1"/>
             <a:r>
               <a:rPr lang="en-US" dirty="0" smtClean="0"/>
-              <a:t> – browser embedded programming language</a:t>
+              <a:t>curl</a:t>
+            </a:r>
+          </a:p>
+          <a:p>
+            <a:r>
+              <a:rPr lang="en-US" dirty="0" smtClean="0"/>
+              <a:t>Programs</a:t>
+            </a:r>
+          </a:p>
+          <a:p>
+            <a:pPr lvl="1"/>
+            <a:r>
+              <a:rPr lang="en-US" dirty="0" smtClean="0"/>
+              <a:t>requesting via code</a:t>
             </a:r>
             <a:endParaRPr lang="en-US" dirty="0"/>
           </a:p>
@@ -18507,13 +19112,20 @@
     </p:spTree>
     <p:extLst>
       <p:ext uri="{BB962C8B-B14F-4D97-AF65-F5344CB8AC3E}">
-        <p14:creationId xmlns:p14="http://schemas.microsoft.com/office/powerpoint/2010/main" val="3985482192"/>
+        <p14:creationId xmlns:p14="http://schemas.microsoft.com/office/powerpoint/2010/main" val="4157348533"/>
       </p:ext>
     </p:extLst>
   </p:cSld>
   <p:clrMapOvr>
     <a:masterClrMapping/>
   </p:clrMapOvr>
+  <p:timing>
+    <p:tnLst>
+      <p:par>
+        <p:cTn id="1" dur="indefinite" restart="never" nodeType="tmRoot"/>
+      </p:par>
+    </p:tnLst>
+  </p:timing>
 </p:sld>
 </file>
 
@@ -18546,12 +19158,29 @@
         </p:nvSpPr>
         <p:spPr/>
         <p:txBody>
-          <a:bodyPr/>
+          <a:bodyPr>
+            <a:normAutofit fontScale="90000"/>
+          </a:bodyPr>
           <a:lstStyle/>
           <a:p>
             <a:r>
               <a:rPr lang="en-US" dirty="0" smtClean="0"/>
-              <a:t>Remember - PHP is on the Server</a:t>
+              <a:t>HTML and CSS</a:t>
+            </a:r>
+            <a:br>
+              <a:rPr lang="en-US" dirty="0" smtClean="0"/>
+            </a:br>
+            <a:r>
+              <a:rPr lang="en-US" dirty="0" smtClean="0"/>
+              <a:t>(and </a:t>
+            </a:r>
+            <a:r>
+              <a:rPr lang="en-US" dirty="0" err="1" smtClean="0"/>
+              <a:t>javascript</a:t>
+            </a:r>
+            <a:r>
+              <a:rPr lang="en-US" dirty="0" smtClean="0"/>
+              <a:t>)</a:t>
             </a:r>
             <a:endParaRPr lang="en-US" dirty="0"/>
           </a:p>
@@ -18573,39 +19202,76 @@
           <a:lstStyle/>
           <a:p>
             <a:r>
+              <a:rPr lang="en-US" b="1" dirty="0" smtClean="0"/>
+              <a:t>HTML</a:t>
+            </a:r>
+            <a:r>
               <a:rPr lang="en-US" dirty="0" smtClean="0"/>
-              <a:t>PHP creates text sent back as an HTTP response</a:t>
-            </a:r>
-          </a:p>
-          <a:p>
+              <a:t> (the Hypertext Markup Language) and </a:t>
+            </a:r>
+            <a:r>
+              <a:rPr lang="en-US" b="1" dirty="0" smtClean="0"/>
+              <a:t>CSS</a:t>
+            </a:r>
             <a:r>
               <a:rPr lang="en-US" dirty="0" smtClean="0"/>
-              <a:t>This is Server Side Processing</a:t>
-            </a:r>
-          </a:p>
-          <a:p>
+              <a:t> (</a:t>
+            </a:r>
+            <a:r>
+              <a:rPr lang="en-US" b="1" dirty="0" smtClean="0"/>
+              <a:t>Cascading Style Sheets</a:t>
+            </a:r>
             <a:r>
               <a:rPr lang="en-US" dirty="0" smtClean="0"/>
-              <a:t>To interact on the client use </a:t>
-            </a:r>
+              <a:t>) are two of the core technologies for building Web pages. </a:t>
+            </a:r>
+            <a:r>
+              <a:rPr lang="en-US" b="1" dirty="0" smtClean="0"/>
+              <a:t>HTML</a:t>
+            </a:r>
+            <a:r>
+              <a:rPr lang="en-US" dirty="0" smtClean="0"/>
+              <a:t> provides the structure of the page, </a:t>
+            </a:r>
+            <a:r>
+              <a:rPr lang="en-US" b="1" dirty="0" smtClean="0"/>
+              <a:t>CSS</a:t>
+            </a:r>
+            <a:r>
+              <a:rPr lang="en-US" dirty="0" smtClean="0"/>
+              <a:t> the (visual and aural) layout, for a variety of devices</a:t>
+            </a:r>
+          </a:p>
+          <a:p>
             <a:r>
               <a:rPr lang="en-US" dirty="0" err="1" smtClean="0"/>
               <a:t>Javascript</a:t>
             </a:r>
-            <a:endParaRPr lang="en-US" dirty="0" smtClean="0"/>
+            <a:r>
+              <a:rPr lang="en-US" dirty="0" smtClean="0"/>
+              <a:t> – browser embedded programming language</a:t>
+            </a:r>
+            <a:endParaRPr lang="en-US" dirty="0"/>
           </a:p>
         </p:txBody>
       </p:sp>
     </p:spTree>
     <p:extLst>
       <p:ext uri="{BB962C8B-B14F-4D97-AF65-F5344CB8AC3E}">
-        <p14:creationId xmlns:p14="http://schemas.microsoft.com/office/powerpoint/2010/main" val="1279082078"/>
+        <p14:creationId xmlns:p14="http://schemas.microsoft.com/office/powerpoint/2010/main" val="3985482192"/>
       </p:ext>
     </p:extLst>
   </p:cSld>
   <p:clrMapOvr>
     <a:masterClrMapping/>
   </p:clrMapOvr>
+  <p:timing>
+    <p:tnLst>
+      <p:par>
+        <p:cTn id="1" dur="indefinite" restart="never" nodeType="tmRoot"/>
+      </p:par>
+    </p:tnLst>
+  </p:timing>
 </p:sld>
 </file>
 
@@ -18643,7 +19309,7 @@
           <a:p>
             <a:r>
               <a:rPr lang="en-US" dirty="0" smtClean="0"/>
-              <a:t>HTTP in PHP</a:t>
+              <a:t>Remember - PHP is on the Server</a:t>
             </a:r>
             <a:endParaRPr lang="en-US" dirty="0"/>
           </a:p>
@@ -18666,38 +19332,215 @@
           <a:p>
             <a:r>
               <a:rPr lang="en-US" dirty="0" smtClean="0"/>
-              <a:t>$_GET and $_POST</a:t>
+              <a:t>PHP creates text sent back as an HTTP response</a:t>
             </a:r>
           </a:p>
           <a:p>
             <a:r>
               <a:rPr lang="en-US" dirty="0" smtClean="0"/>
-              <a:t>headers</a:t>
+              <a:t>This is Server Side Processing</a:t>
             </a:r>
           </a:p>
           <a:p>
             <a:r>
               <a:rPr lang="en-US" dirty="0" smtClean="0"/>
-              <a:t>redirects</a:t>
-            </a:r>
-            <a:endParaRPr lang="en-US" dirty="0"/>
+              <a:t>To interact on the client use </a:t>
+            </a:r>
+            <a:r>
+              <a:rPr lang="en-US" dirty="0" err="1" smtClean="0"/>
+              <a:t>Javascript</a:t>
+            </a:r>
+            <a:endParaRPr lang="en-US" dirty="0" smtClean="0"/>
           </a:p>
         </p:txBody>
       </p:sp>
     </p:spTree>
     <p:extLst>
       <p:ext uri="{BB962C8B-B14F-4D97-AF65-F5344CB8AC3E}">
-        <p14:creationId xmlns:p14="http://schemas.microsoft.com/office/powerpoint/2010/main" val="1441484924"/>
+        <p14:creationId xmlns:p14="http://schemas.microsoft.com/office/powerpoint/2010/main" val="1279082078"/>
       </p:ext>
     </p:extLst>
   </p:cSld>
   <p:clrMapOvr>
     <a:masterClrMapping/>
   </p:clrMapOvr>
+  <p:timing>
+    <p:tnLst>
+      <p:par>
+        <p:cTn id="1" dur="indefinite" restart="never" nodeType="tmRoot"/>
+      </p:par>
+    </p:tnLst>
+  </p:timing>
 </p:sld>
 </file>
 
 <file path=ppt/slides/slide19.xml><?xml version="1.0" encoding="utf-8"?>
+<p:sld xmlns:a="http://schemas.openxmlformats.org/drawingml/2006/main" xmlns:r="http://schemas.openxmlformats.org/officeDocument/2006/relationships" xmlns:p="http://schemas.openxmlformats.org/presentationml/2006/main">
+  <p:cSld>
+    <p:spTree>
+      <p:nvGrpSpPr>
+        <p:cNvPr id="1" name=""/>
+        <p:cNvGrpSpPr/>
+        <p:nvPr/>
+      </p:nvGrpSpPr>
+      <p:grpSpPr>
+        <a:xfrm>
+          <a:off x="0" y="0"/>
+          <a:ext cx="0" cy="0"/>
+          <a:chOff x="0" y="0"/>
+          <a:chExt cx="0" cy="0"/>
+        </a:xfrm>
+      </p:grpSpPr>
+      <p:sp>
+        <p:nvSpPr>
+          <p:cNvPr id="4" name="Title 3"/>
+          <p:cNvSpPr>
+            <a:spLocks noGrp="1"/>
+          </p:cNvSpPr>
+          <p:nvPr>
+            <p:ph type="title"/>
+          </p:nvPr>
+        </p:nvSpPr>
+        <p:spPr/>
+        <p:txBody>
+          <a:bodyPr/>
+          <a:lstStyle/>
+          <a:p>
+            <a:r>
+              <a:rPr lang="en-US" dirty="0" smtClean="0"/>
+              <a:t>Basic Html</a:t>
+            </a:r>
+            <a:endParaRPr lang="en-US" dirty="0"/>
+          </a:p>
+        </p:txBody>
+      </p:sp>
+      <p:sp>
+        <p:nvSpPr>
+          <p:cNvPr id="5" name="Text Placeholder 4"/>
+          <p:cNvSpPr>
+            <a:spLocks noGrp="1"/>
+          </p:cNvSpPr>
+          <p:nvPr>
+            <p:ph type="body" idx="1"/>
+          </p:nvPr>
+        </p:nvSpPr>
+        <p:spPr/>
+        <p:txBody>
+          <a:bodyPr/>
+          <a:lstStyle/>
+          <a:p>
+            <a:r>
+              <a:rPr lang="en-US" dirty="0" smtClean="0"/>
+              <a:t>Lesson 2:</a:t>
+            </a:r>
+            <a:endParaRPr lang="en-US" dirty="0"/>
+          </a:p>
+        </p:txBody>
+      </p:sp>
+    </p:spTree>
+    <p:extLst>
+      <p:ext uri="{BB962C8B-B14F-4D97-AF65-F5344CB8AC3E}">
+        <p14:creationId xmlns:p14="http://schemas.microsoft.com/office/powerpoint/2010/main" val="2117279510"/>
+      </p:ext>
+    </p:extLst>
+  </p:cSld>
+  <p:clrMapOvr>
+    <a:masterClrMapping/>
+  </p:clrMapOvr>
+  <p:timing>
+    <p:tnLst>
+      <p:par>
+        <p:cTn id="1" dur="indefinite" restart="never" nodeType="tmRoot"/>
+      </p:par>
+    </p:tnLst>
+  </p:timing>
+</p:sld>
+</file>
+
+<file path=ppt/slides/slide2.xml><?xml version="1.0" encoding="utf-8"?>
+<p:sld xmlns:a="http://schemas.openxmlformats.org/drawingml/2006/main" xmlns:r="http://schemas.openxmlformats.org/officeDocument/2006/relationships" xmlns:p="http://schemas.openxmlformats.org/presentationml/2006/main">
+  <p:cSld>
+    <p:spTree>
+      <p:nvGrpSpPr>
+        <p:cNvPr id="1" name=""/>
+        <p:cNvGrpSpPr/>
+        <p:nvPr/>
+      </p:nvGrpSpPr>
+      <p:grpSpPr>
+        <a:xfrm>
+          <a:off x="0" y="0"/>
+          <a:ext cx="0" cy="0"/>
+          <a:chOff x="0" y="0"/>
+          <a:chExt cx="0" cy="0"/>
+        </a:xfrm>
+      </p:grpSpPr>
+      <p:sp>
+        <p:nvSpPr>
+          <p:cNvPr id="4" name="Title 3"/>
+          <p:cNvSpPr>
+            <a:spLocks noGrp="1"/>
+          </p:cNvSpPr>
+          <p:nvPr>
+            <p:ph type="title"/>
+          </p:nvPr>
+        </p:nvSpPr>
+        <p:spPr/>
+        <p:txBody>
+          <a:bodyPr/>
+          <a:lstStyle/>
+          <a:p>
+            <a:r>
+              <a:rPr lang="en-US" dirty="0" smtClean="0"/>
+              <a:t>Internet Basics</a:t>
+            </a:r>
+            <a:endParaRPr lang="en-US" dirty="0"/>
+          </a:p>
+        </p:txBody>
+      </p:sp>
+      <p:sp>
+        <p:nvSpPr>
+          <p:cNvPr id="5" name="Text Placeholder 4"/>
+          <p:cNvSpPr>
+            <a:spLocks noGrp="1"/>
+          </p:cNvSpPr>
+          <p:nvPr>
+            <p:ph type="body" idx="1"/>
+          </p:nvPr>
+        </p:nvSpPr>
+        <p:spPr/>
+        <p:txBody>
+          <a:bodyPr/>
+          <a:lstStyle/>
+          <a:p>
+            <a:r>
+              <a:rPr lang="en-US" dirty="0" smtClean="0"/>
+              <a:t>Lesson 1:</a:t>
+            </a:r>
+            <a:endParaRPr lang="en-US" dirty="0"/>
+          </a:p>
+        </p:txBody>
+      </p:sp>
+    </p:spTree>
+    <p:extLst>
+      <p:ext uri="{BB962C8B-B14F-4D97-AF65-F5344CB8AC3E}">
+        <p14:creationId xmlns:p14="http://schemas.microsoft.com/office/powerpoint/2010/main" val="2102965946"/>
+      </p:ext>
+    </p:extLst>
+  </p:cSld>
+  <p:clrMapOvr>
+    <a:masterClrMapping/>
+  </p:clrMapOvr>
+  <p:timing>
+    <p:tnLst>
+      <p:par>
+        <p:cTn id="1" dur="indefinite" restart="never" nodeType="tmRoot"/>
+      </p:par>
+    </p:tnLst>
+  </p:timing>
+</p:sld>
+</file>
+
+<file path=ppt/slides/slide20.xml><?xml version="1.0" encoding="utf-8"?>
 <p:sld xmlns:a="http://schemas.openxmlformats.org/drawingml/2006/main" xmlns:r="http://schemas.openxmlformats.org/officeDocument/2006/relationships" xmlns:p="http://schemas.openxmlformats.org/presentationml/2006/main">
   <p:cSld>
     <p:spTree>
@@ -18731,7 +19574,7 @@
           <a:p>
             <a:r>
               <a:rPr lang="en-US" dirty="0" smtClean="0"/>
-              <a:t>Using Forms</a:t>
+              <a:t>Redirects and Headers</a:t>
             </a:r>
             <a:endParaRPr lang="en-US" dirty="0"/>
           </a:p>
@@ -18739,12 +19582,12 @@
       </p:sp>
       <p:sp>
         <p:nvSpPr>
-          <p:cNvPr id="3" name="Content Placeholder 2"/>
+          <p:cNvPr id="4" name="Text Placeholder 3"/>
           <p:cNvSpPr>
             <a:spLocks noGrp="1"/>
           </p:cNvSpPr>
           <p:nvPr>
-            <p:ph idx="1"/>
+            <p:ph type="body" idx="1"/>
           </p:nvPr>
         </p:nvSpPr>
         <p:spPr/>
@@ -18754,39 +19597,7 @@
           <a:p>
             <a:r>
               <a:rPr lang="en-US" dirty="0" smtClean="0"/>
-              <a:t>basic forms (</a:t>
-            </a:r>
-            <a:r>
-              <a:rPr lang="en-US" dirty="0" err="1" smtClean="0"/>
-              <a:t>var</a:t>
-            </a:r>
-            <a:r>
-              <a:rPr lang="en-US" dirty="0" smtClean="0"/>
-              <a:t> dump data)</a:t>
-            </a:r>
-          </a:p>
-          <a:p>
-            <a:r>
-              <a:rPr lang="en-US" dirty="0" smtClean="0"/>
-              <a:t>basic security (all people are evil cats – so validate all data)</a:t>
-            </a:r>
-          </a:p>
-          <a:p>
-            <a:r>
-              <a:rPr lang="en-US" dirty="0" smtClean="0"/>
-              <a:t>check input (validation groups)</a:t>
-            </a:r>
-          </a:p>
-          <a:p>
-            <a:r>
-              <a:rPr lang="en-US" dirty="0" smtClean="0"/>
-              <a:t>escape output – separation of concerns</a:t>
-            </a:r>
-          </a:p>
-          <a:p>
-            <a:r>
-              <a:rPr lang="en-US" dirty="0" smtClean="0"/>
-              <a:t>populating forms after error, handling errors and redirection</a:t>
+              <a:t>Lesson 3:</a:t>
             </a:r>
             <a:endParaRPr lang="en-US" dirty="0"/>
           </a:p>
@@ -18795,17 +19606,107 @@
     </p:spTree>
     <p:extLst>
       <p:ext uri="{BB962C8B-B14F-4D97-AF65-F5344CB8AC3E}">
-        <p14:creationId xmlns:p14="http://schemas.microsoft.com/office/powerpoint/2010/main" val="3206969019"/>
+        <p14:creationId xmlns:p14="http://schemas.microsoft.com/office/powerpoint/2010/main" val="3631107938"/>
       </p:ext>
     </p:extLst>
   </p:cSld>
   <p:clrMapOvr>
     <a:masterClrMapping/>
   </p:clrMapOvr>
+  <p:timing>
+    <p:tnLst>
+      <p:par>
+        <p:cTn id="1" dur="indefinite" restart="never" nodeType="tmRoot"/>
+      </p:par>
+    </p:tnLst>
+  </p:timing>
 </p:sld>
 </file>
 
-<file path=ppt/slides/slide2.xml><?xml version="1.0" encoding="utf-8"?>
+<file path=ppt/slides/slide21.xml><?xml version="1.0" encoding="utf-8"?>
+<p:sld xmlns:a="http://schemas.openxmlformats.org/drawingml/2006/main" xmlns:r="http://schemas.openxmlformats.org/officeDocument/2006/relationships" xmlns:p="http://schemas.openxmlformats.org/presentationml/2006/main">
+  <p:cSld>
+    <p:spTree>
+      <p:nvGrpSpPr>
+        <p:cNvPr id="1" name=""/>
+        <p:cNvGrpSpPr/>
+        <p:nvPr/>
+      </p:nvGrpSpPr>
+      <p:grpSpPr>
+        <a:xfrm>
+          <a:off x="0" y="0"/>
+          <a:ext cx="0" cy="0"/>
+          <a:chOff x="0" y="0"/>
+          <a:chExt cx="0" cy="0"/>
+        </a:xfrm>
+      </p:grpSpPr>
+      <p:sp>
+        <p:nvSpPr>
+          <p:cNvPr id="4" name="Title 3"/>
+          <p:cNvSpPr>
+            <a:spLocks noGrp="1"/>
+          </p:cNvSpPr>
+          <p:nvPr>
+            <p:ph type="title"/>
+          </p:nvPr>
+        </p:nvSpPr>
+        <p:spPr/>
+        <p:txBody>
+          <a:bodyPr/>
+          <a:lstStyle/>
+          <a:p>
+            <a:r>
+              <a:rPr lang="en-US" dirty="0" smtClean="0"/>
+              <a:t>Forms</a:t>
+            </a:r>
+            <a:endParaRPr lang="en-US" dirty="0"/>
+          </a:p>
+        </p:txBody>
+      </p:sp>
+      <p:sp>
+        <p:nvSpPr>
+          <p:cNvPr id="5" name="Text Placeholder 4"/>
+          <p:cNvSpPr>
+            <a:spLocks noGrp="1"/>
+          </p:cNvSpPr>
+          <p:nvPr>
+            <p:ph type="body" idx="1"/>
+          </p:nvPr>
+        </p:nvSpPr>
+        <p:spPr/>
+        <p:txBody>
+          <a:bodyPr/>
+          <a:lstStyle/>
+          <a:p>
+            <a:r>
+              <a:rPr lang="en-US" dirty="0" smtClean="0"/>
+              <a:t>Lesson 4:</a:t>
+            </a:r>
+            <a:endParaRPr lang="en-US" dirty="0"/>
+          </a:p>
+        </p:txBody>
+      </p:sp>
+    </p:spTree>
+    <p:extLst>
+      <p:ext uri="{BB962C8B-B14F-4D97-AF65-F5344CB8AC3E}">
+        <p14:creationId xmlns:p14="http://schemas.microsoft.com/office/powerpoint/2010/main" val="1954805923"/>
+      </p:ext>
+    </p:extLst>
+  </p:cSld>
+  <p:clrMapOvr>
+    <a:masterClrMapping/>
+  </p:clrMapOvr>
+  <p:timing>
+    <p:tnLst>
+      <p:par>
+        <p:cTn id="1" dur="indefinite" restart="never" nodeType="tmRoot"/>
+      </p:par>
+    </p:tnLst>
+  </p:timing>
+</p:sld>
+</file>
+
+<file path=ppt/slides/slide22.xml><?xml version="1.0" encoding="utf-8"?>
 <p:sld xmlns:a="http://schemas.openxmlformats.org/drawingml/2006/main" xmlns:r="http://schemas.openxmlformats.org/officeDocument/2006/relationships" xmlns:p="http://schemas.openxmlformats.org/presentationml/2006/main">
   <p:cSld>
     <p:spTree>
@@ -18839,7 +19740,7 @@
           <a:p>
             <a:r>
               <a:rPr lang="en-US" dirty="0" smtClean="0"/>
-              <a:t>What is the Internet?</a:t>
+              <a:t>HTTP in PHP</a:t>
             </a:r>
             <a:endParaRPr lang="en-US" dirty="0"/>
           </a:p>
@@ -18862,6 +19763,416 @@
           <a:p>
             <a:r>
               <a:rPr lang="en-US" dirty="0" smtClean="0"/>
+              <a:t>$_GET and $_POST</a:t>
+            </a:r>
+          </a:p>
+          <a:p>
+            <a:r>
+              <a:rPr lang="en-US" dirty="0" smtClean="0"/>
+              <a:t>headers</a:t>
+            </a:r>
+          </a:p>
+          <a:p>
+            <a:r>
+              <a:rPr lang="en-US" dirty="0" smtClean="0"/>
+              <a:t>redirects</a:t>
+            </a:r>
+            <a:endParaRPr lang="en-US" dirty="0"/>
+          </a:p>
+        </p:txBody>
+      </p:sp>
+    </p:spTree>
+    <p:extLst>
+      <p:ext uri="{BB962C8B-B14F-4D97-AF65-F5344CB8AC3E}">
+        <p14:creationId xmlns:p14="http://schemas.microsoft.com/office/powerpoint/2010/main" val="1441484924"/>
+      </p:ext>
+    </p:extLst>
+  </p:cSld>
+  <p:clrMapOvr>
+    <a:masterClrMapping/>
+  </p:clrMapOvr>
+  <p:timing>
+    <p:tnLst>
+      <p:par>
+        <p:cTn id="1" dur="indefinite" restart="never" nodeType="tmRoot"/>
+      </p:par>
+    </p:tnLst>
+  </p:timing>
+</p:sld>
+</file>
+
+<file path=ppt/slides/slide23.xml><?xml version="1.0" encoding="utf-8"?>
+<p:sld xmlns:a="http://schemas.openxmlformats.org/drawingml/2006/main" xmlns:r="http://schemas.openxmlformats.org/officeDocument/2006/relationships" xmlns:p="http://schemas.openxmlformats.org/presentationml/2006/main">
+  <p:cSld>
+    <p:spTree>
+      <p:nvGrpSpPr>
+        <p:cNvPr id="1" name=""/>
+        <p:cNvGrpSpPr/>
+        <p:nvPr/>
+      </p:nvGrpSpPr>
+      <p:grpSpPr>
+        <a:xfrm>
+          <a:off x="0" y="0"/>
+          <a:ext cx="0" cy="0"/>
+          <a:chOff x="0" y="0"/>
+          <a:chExt cx="0" cy="0"/>
+        </a:xfrm>
+      </p:grpSpPr>
+      <p:sp>
+        <p:nvSpPr>
+          <p:cNvPr id="2" name="Title 1"/>
+          <p:cNvSpPr>
+            <a:spLocks noGrp="1"/>
+          </p:cNvSpPr>
+          <p:nvPr>
+            <p:ph type="title"/>
+          </p:nvPr>
+        </p:nvSpPr>
+        <p:spPr/>
+        <p:txBody>
+          <a:bodyPr/>
+          <a:lstStyle/>
+          <a:p>
+            <a:r>
+              <a:rPr lang="en-US" dirty="0" smtClean="0"/>
+              <a:t>Using Forms</a:t>
+            </a:r>
+            <a:endParaRPr lang="en-US" dirty="0"/>
+          </a:p>
+        </p:txBody>
+      </p:sp>
+      <p:sp>
+        <p:nvSpPr>
+          <p:cNvPr id="3" name="Content Placeholder 2"/>
+          <p:cNvSpPr>
+            <a:spLocks noGrp="1"/>
+          </p:cNvSpPr>
+          <p:nvPr>
+            <p:ph idx="1"/>
+          </p:nvPr>
+        </p:nvSpPr>
+        <p:spPr/>
+        <p:txBody>
+          <a:bodyPr/>
+          <a:lstStyle/>
+          <a:p>
+            <a:r>
+              <a:rPr lang="en-US" dirty="0" smtClean="0"/>
+              <a:t>basic forms (</a:t>
+            </a:r>
+            <a:r>
+              <a:rPr lang="en-US" dirty="0" err="1" smtClean="0"/>
+              <a:t>var</a:t>
+            </a:r>
+            <a:r>
+              <a:rPr lang="en-US" dirty="0" smtClean="0"/>
+              <a:t> dump data)</a:t>
+            </a:r>
+          </a:p>
+          <a:p>
+            <a:r>
+              <a:rPr lang="en-US" dirty="0" smtClean="0"/>
+              <a:t>basic security (all people are evil cats – so validate all data)</a:t>
+            </a:r>
+          </a:p>
+          <a:p>
+            <a:r>
+              <a:rPr lang="en-US" dirty="0" smtClean="0"/>
+              <a:t>check input (validation groups)</a:t>
+            </a:r>
+          </a:p>
+          <a:p>
+            <a:r>
+              <a:rPr lang="en-US" dirty="0" smtClean="0"/>
+              <a:t>escape output – separation of concerns</a:t>
+            </a:r>
+          </a:p>
+          <a:p>
+            <a:r>
+              <a:rPr lang="en-US" dirty="0" smtClean="0"/>
+              <a:t>populating forms after error, handling errors and redirection</a:t>
+            </a:r>
+            <a:endParaRPr lang="en-US" dirty="0"/>
+          </a:p>
+        </p:txBody>
+      </p:sp>
+    </p:spTree>
+    <p:extLst>
+      <p:ext uri="{BB962C8B-B14F-4D97-AF65-F5344CB8AC3E}">
+        <p14:creationId xmlns:p14="http://schemas.microsoft.com/office/powerpoint/2010/main" val="3206969019"/>
+      </p:ext>
+    </p:extLst>
+  </p:cSld>
+  <p:clrMapOvr>
+    <a:masterClrMapping/>
+  </p:clrMapOvr>
+  <p:timing>
+    <p:tnLst>
+      <p:par>
+        <p:cTn id="1" dur="indefinite" restart="never" nodeType="tmRoot"/>
+      </p:par>
+    </p:tnLst>
+  </p:timing>
+</p:sld>
+</file>
+
+<file path=ppt/slides/slide24.xml><?xml version="1.0" encoding="utf-8"?>
+<p:sld xmlns:a="http://schemas.openxmlformats.org/drawingml/2006/main" xmlns:r="http://schemas.openxmlformats.org/officeDocument/2006/relationships" xmlns:p="http://schemas.openxmlformats.org/presentationml/2006/main">
+  <p:cSld>
+    <p:spTree>
+      <p:nvGrpSpPr>
+        <p:cNvPr id="1" name=""/>
+        <p:cNvGrpSpPr/>
+        <p:nvPr/>
+      </p:nvGrpSpPr>
+      <p:grpSpPr>
+        <a:xfrm>
+          <a:off x="0" y="0"/>
+          <a:ext cx="0" cy="0"/>
+          <a:chOff x="0" y="0"/>
+          <a:chExt cx="0" cy="0"/>
+        </a:xfrm>
+      </p:grpSpPr>
+      <p:sp>
+        <p:nvSpPr>
+          <p:cNvPr id="4" name="Title 3"/>
+          <p:cNvSpPr>
+            <a:spLocks noGrp="1"/>
+          </p:cNvSpPr>
+          <p:nvPr>
+            <p:ph type="title"/>
+          </p:nvPr>
+        </p:nvSpPr>
+        <p:spPr/>
+        <p:txBody>
+          <a:bodyPr/>
+          <a:lstStyle/>
+          <a:p>
+            <a:r>
+              <a:rPr lang="en-US" dirty="0" smtClean="0"/>
+              <a:t>Sessions</a:t>
+            </a:r>
+            <a:endParaRPr lang="en-US" dirty="0"/>
+          </a:p>
+        </p:txBody>
+      </p:sp>
+      <p:sp>
+        <p:nvSpPr>
+          <p:cNvPr id="5" name="Text Placeholder 4"/>
+          <p:cNvSpPr>
+            <a:spLocks noGrp="1"/>
+          </p:cNvSpPr>
+          <p:nvPr>
+            <p:ph type="body" idx="1"/>
+          </p:nvPr>
+        </p:nvSpPr>
+        <p:spPr/>
+        <p:txBody>
+          <a:bodyPr/>
+          <a:lstStyle/>
+          <a:p>
+            <a:r>
+              <a:rPr lang="en-US" dirty="0" smtClean="0"/>
+              <a:t>Lesson 5:</a:t>
+            </a:r>
+            <a:endParaRPr lang="en-US" dirty="0"/>
+          </a:p>
+        </p:txBody>
+      </p:sp>
+    </p:spTree>
+    <p:extLst>
+      <p:ext uri="{BB962C8B-B14F-4D97-AF65-F5344CB8AC3E}">
+        <p14:creationId xmlns:p14="http://schemas.microsoft.com/office/powerpoint/2010/main" val="1683317461"/>
+      </p:ext>
+    </p:extLst>
+  </p:cSld>
+  <p:clrMapOvr>
+    <a:masterClrMapping/>
+  </p:clrMapOvr>
+  <p:timing>
+    <p:tnLst>
+      <p:par>
+        <p:cTn id="1" dur="indefinite" restart="never" nodeType="tmRoot"/>
+      </p:par>
+    </p:tnLst>
+  </p:timing>
+</p:sld>
+</file>
+
+<file path=ppt/slides/slide25.xml><?xml version="1.0" encoding="utf-8"?>
+<p:sld xmlns:a="http://schemas.openxmlformats.org/drawingml/2006/main" xmlns:r="http://schemas.openxmlformats.org/officeDocument/2006/relationships" xmlns:p="http://schemas.openxmlformats.org/presentationml/2006/main">
+  <p:cSld>
+    <p:spTree>
+      <p:nvGrpSpPr>
+        <p:cNvPr id="1" name=""/>
+        <p:cNvGrpSpPr/>
+        <p:nvPr/>
+      </p:nvGrpSpPr>
+      <p:grpSpPr>
+        <a:xfrm>
+          <a:off x="0" y="0"/>
+          <a:ext cx="0" cy="0"/>
+          <a:chOff x="0" y="0"/>
+          <a:chExt cx="0" cy="0"/>
+        </a:xfrm>
+      </p:grpSpPr>
+      <p:sp>
+        <p:nvSpPr>
+          <p:cNvPr id="2" name="Title 1"/>
+          <p:cNvSpPr>
+            <a:spLocks noGrp="1"/>
+          </p:cNvSpPr>
+          <p:nvPr>
+            <p:ph type="title"/>
+          </p:nvPr>
+        </p:nvSpPr>
+        <p:spPr/>
+        <p:txBody>
+          <a:bodyPr/>
+          <a:lstStyle/>
+          <a:p>
+            <a:r>
+              <a:rPr lang="en-US" dirty="0" smtClean="0"/>
+              <a:t>Sessions</a:t>
+            </a:r>
+            <a:endParaRPr lang="en-US" dirty="0"/>
+          </a:p>
+        </p:txBody>
+      </p:sp>
+      <p:sp>
+        <p:nvSpPr>
+          <p:cNvPr id="3" name="Content Placeholder 2"/>
+          <p:cNvSpPr>
+            <a:spLocks noGrp="1"/>
+          </p:cNvSpPr>
+          <p:nvPr>
+            <p:ph idx="1"/>
+          </p:nvPr>
+        </p:nvSpPr>
+        <p:spPr/>
+        <p:txBody>
+          <a:bodyPr/>
+          <a:lstStyle/>
+          <a:p>
+            <a:r>
+              <a:rPr lang="en-US" dirty="0" err="1" smtClean="0"/>
+              <a:t>session_start</a:t>
+            </a:r>
+            <a:r>
+              <a:rPr lang="en-US" dirty="0" smtClean="0"/>
+              <a:t>()</a:t>
+            </a:r>
+          </a:p>
+          <a:p>
+            <a:r>
+              <a:rPr lang="en-US" dirty="0" smtClean="0"/>
+              <a:t>$_SESSION holds your data</a:t>
+            </a:r>
+          </a:p>
+          <a:p>
+            <a:r>
+              <a:rPr lang="en-US" dirty="0" err="1" smtClean="0"/>
+              <a:t>session_write_close</a:t>
+            </a:r>
+            <a:r>
+              <a:rPr lang="en-US" dirty="0" smtClean="0"/>
+              <a:t>() before redirect</a:t>
+            </a:r>
+          </a:p>
+          <a:p>
+            <a:r>
+              <a:rPr lang="en-US" dirty="0" smtClean="0"/>
+              <a:t>no output before </a:t>
+            </a:r>
+            <a:r>
+              <a:rPr lang="en-US" dirty="0" err="1" smtClean="0"/>
+              <a:t>session_start</a:t>
+            </a:r>
+            <a:r>
+              <a:rPr lang="en-US" dirty="0" smtClean="0"/>
+              <a:t>()</a:t>
+            </a:r>
+            <a:endParaRPr lang="en-US" dirty="0"/>
+          </a:p>
+        </p:txBody>
+      </p:sp>
+    </p:spTree>
+    <p:extLst>
+      <p:ext uri="{BB962C8B-B14F-4D97-AF65-F5344CB8AC3E}">
+        <p14:creationId xmlns:p14="http://schemas.microsoft.com/office/powerpoint/2010/main" val="883704607"/>
+      </p:ext>
+    </p:extLst>
+  </p:cSld>
+  <p:clrMapOvr>
+    <a:masterClrMapping/>
+  </p:clrMapOvr>
+  <p:timing>
+    <p:tnLst>
+      <p:par>
+        <p:cTn id="1" dur="indefinite" restart="never" nodeType="tmRoot"/>
+      </p:par>
+    </p:tnLst>
+  </p:timing>
+</p:sld>
+</file>
+
+<file path=ppt/slides/slide3.xml><?xml version="1.0" encoding="utf-8"?>
+<p:sld xmlns:a="http://schemas.openxmlformats.org/drawingml/2006/main" xmlns:r="http://schemas.openxmlformats.org/officeDocument/2006/relationships" xmlns:p="http://schemas.openxmlformats.org/presentationml/2006/main">
+  <p:cSld>
+    <p:spTree>
+      <p:nvGrpSpPr>
+        <p:cNvPr id="1" name=""/>
+        <p:cNvGrpSpPr/>
+        <p:nvPr/>
+      </p:nvGrpSpPr>
+      <p:grpSpPr>
+        <a:xfrm>
+          <a:off x="0" y="0"/>
+          <a:ext cx="0" cy="0"/>
+          <a:chOff x="0" y="0"/>
+          <a:chExt cx="0" cy="0"/>
+        </a:xfrm>
+      </p:grpSpPr>
+      <p:sp>
+        <p:nvSpPr>
+          <p:cNvPr id="2" name="Title 1"/>
+          <p:cNvSpPr>
+            <a:spLocks noGrp="1"/>
+          </p:cNvSpPr>
+          <p:nvPr>
+            <p:ph type="title"/>
+          </p:nvPr>
+        </p:nvSpPr>
+        <p:spPr/>
+        <p:txBody>
+          <a:bodyPr/>
+          <a:lstStyle/>
+          <a:p>
+            <a:r>
+              <a:rPr lang="en-US" dirty="0" smtClean="0"/>
+              <a:t>What is the Internet?</a:t>
+            </a:r>
+            <a:endParaRPr lang="en-US" dirty="0"/>
+          </a:p>
+        </p:txBody>
+      </p:sp>
+      <p:sp>
+        <p:nvSpPr>
+          <p:cNvPr id="3" name="Content Placeholder 2"/>
+          <p:cNvSpPr>
+            <a:spLocks noGrp="1"/>
+          </p:cNvSpPr>
+          <p:nvPr>
+            <p:ph idx="1"/>
+          </p:nvPr>
+        </p:nvSpPr>
+        <p:spPr/>
+        <p:txBody>
+          <a:bodyPr/>
+          <a:lstStyle/>
+          <a:p>
+            <a:r>
+              <a:rPr lang="en-US" dirty="0" smtClean="0"/>
               <a:t>The </a:t>
             </a:r>
             <a:r>
@@ -18894,10 +20205,17 @@
   <p:clrMapOvr>
     <a:masterClrMapping/>
   </p:clrMapOvr>
+  <p:timing>
+    <p:tnLst>
+      <p:par>
+        <p:cTn id="1" dur="indefinite" restart="never" nodeType="tmRoot"/>
+      </p:par>
+    </p:tnLst>
+  </p:timing>
 </p:sld>
 </file>
 
-<file path=ppt/slides/slide3.xml><?xml version="1.0" encoding="utf-8"?>
+<file path=ppt/slides/slide4.xml><?xml version="1.0" encoding="utf-8"?>
 <p:sld xmlns:a="http://schemas.openxmlformats.org/drawingml/2006/main" xmlns:r="http://schemas.openxmlformats.org/officeDocument/2006/relationships" xmlns:p="http://schemas.openxmlformats.org/presentationml/2006/main">
   <p:cSld>
     <p:spTree>
@@ -18972,98 +20290,13 @@
   <p:clrMapOvr>
     <a:masterClrMapping/>
   </p:clrMapOvr>
-</p:sld>
-</file>
-
-<file path=ppt/slides/slide4.xml><?xml version="1.0" encoding="utf-8"?>
-<p:sld xmlns:a="http://schemas.openxmlformats.org/drawingml/2006/main" xmlns:r="http://schemas.openxmlformats.org/officeDocument/2006/relationships" xmlns:p="http://schemas.openxmlformats.org/presentationml/2006/main">
-  <p:cSld>
-    <p:spTree>
-      <p:nvGrpSpPr>
-        <p:cNvPr id="1" name=""/>
-        <p:cNvGrpSpPr/>
-        <p:nvPr/>
-      </p:nvGrpSpPr>
-      <p:grpSpPr>
-        <a:xfrm>
-          <a:off x="0" y="0"/>
-          <a:ext cx="0" cy="0"/>
-          <a:chOff x="0" y="0"/>
-          <a:chExt cx="0" cy="0"/>
-        </a:xfrm>
-      </p:grpSpPr>
-      <p:sp>
-        <p:nvSpPr>
-          <p:cNvPr id="2" name="Title 1"/>
-          <p:cNvSpPr>
-            <a:spLocks noGrp="1"/>
-          </p:cNvSpPr>
-          <p:nvPr>
-            <p:ph type="title"/>
-          </p:nvPr>
-        </p:nvSpPr>
-        <p:spPr/>
-        <p:txBody>
-          <a:bodyPr/>
-          <a:lstStyle/>
-          <a:p>
-            <a:r>
-              <a:rPr lang="en-US" dirty="0" smtClean="0"/>
-              <a:t>TCP/IP</a:t>
-            </a:r>
-            <a:endParaRPr lang="en-US" dirty="0"/>
-          </a:p>
-        </p:txBody>
-      </p:sp>
-      <p:sp>
-        <p:nvSpPr>
-          <p:cNvPr id="3" name="Content Placeholder 2"/>
-          <p:cNvSpPr>
-            <a:spLocks noGrp="1"/>
-          </p:cNvSpPr>
-          <p:nvPr>
-            <p:ph idx="1"/>
-          </p:nvPr>
-        </p:nvSpPr>
-        <p:spPr/>
-        <p:txBody>
-          <a:bodyPr/>
-          <a:lstStyle/>
-          <a:p>
-            <a:r>
-              <a:rPr lang="en-US" dirty="0" smtClean="0"/>
-              <a:t>Transmission Control Protocol (</a:t>
-            </a:r>
-            <a:r>
-              <a:rPr lang="en-US" b="1" dirty="0" smtClean="0"/>
-              <a:t>TCP</a:t>
-            </a:r>
-            <a:r>
-              <a:rPr lang="en-US" dirty="0" smtClean="0"/>
-              <a:t>) and the Internet Protocol (</a:t>
-            </a:r>
-            <a:r>
-              <a:rPr lang="en-US" b="1" dirty="0" smtClean="0"/>
-              <a:t>IP</a:t>
-            </a:r>
-            <a:r>
-              <a:rPr lang="en-US" dirty="0" smtClean="0"/>
-              <a:t>)</a:t>
-            </a:r>
-            <a:endParaRPr lang="en-US" dirty="0"/>
-          </a:p>
-        </p:txBody>
-      </p:sp>
-    </p:spTree>
-    <p:extLst>
-      <p:ext uri="{BB962C8B-B14F-4D97-AF65-F5344CB8AC3E}">
-        <p14:creationId xmlns:p14="http://schemas.microsoft.com/office/powerpoint/2010/main" val="4004731501"/>
-      </p:ext>
-    </p:extLst>
-  </p:cSld>
-  <p:clrMapOvr>
-    <a:masterClrMapping/>
-  </p:clrMapOvr>
+  <p:timing>
+    <p:tnLst>
+      <p:par>
+        <p:cTn id="1" dur="indefinite" restart="never" nodeType="tmRoot"/>
+      </p:par>
+    </p:tnLst>
+  </p:timing>
 </p:sld>
 </file>
 
@@ -19101,7 +20334,7 @@
           <a:p>
             <a:r>
               <a:rPr lang="en-US" dirty="0" smtClean="0"/>
-              <a:t>IP</a:t>
+              <a:t>TCP/IP</a:t>
             </a:r>
             <a:endParaRPr lang="en-US" dirty="0"/>
           </a:p>
@@ -19124,22 +20357,24 @@
           <a:p>
             <a:r>
               <a:rPr lang="en-US" dirty="0" smtClean="0"/>
-              <a:t>IP address -&gt; where we’re going</a:t>
-            </a:r>
-          </a:p>
-          <a:p>
+              <a:t>Transmission Control Protocol (</a:t>
+            </a:r>
+            <a:r>
+              <a:rPr lang="en-US" b="1" dirty="0" smtClean="0"/>
+              <a:t>TCP</a:t>
+            </a:r>
             <a:r>
               <a:rPr lang="en-US" dirty="0" smtClean="0"/>
-              <a:t>IP restricts size – 64K – but doesn’t care how it gets chopped up</a:t>
-            </a:r>
-          </a:p>
-          <a:p>
+              <a:t>) and the Internet Protocol (</a:t>
+            </a:r>
+            <a:r>
+              <a:rPr lang="en-US" b="1" dirty="0" smtClean="0"/>
+              <a:t>IP</a:t>
+            </a:r>
             <a:r>
               <a:rPr lang="en-US" dirty="0" smtClean="0"/>
-              <a:t>IP cares nothing for order or when things arrive</a:t>
-            </a:r>
-          </a:p>
-          <a:p>
+              <a:t>)</a:t>
+            </a:r>
             <a:endParaRPr lang="en-US" dirty="0"/>
           </a:p>
         </p:txBody>
@@ -19147,13 +20382,20 @@
     </p:spTree>
     <p:extLst>
       <p:ext uri="{BB962C8B-B14F-4D97-AF65-F5344CB8AC3E}">
-        <p14:creationId xmlns:p14="http://schemas.microsoft.com/office/powerpoint/2010/main" val="2745982986"/>
+        <p14:creationId xmlns:p14="http://schemas.microsoft.com/office/powerpoint/2010/main" val="4004731501"/>
       </p:ext>
     </p:extLst>
   </p:cSld>
   <p:clrMapOvr>
     <a:masterClrMapping/>
   </p:clrMapOvr>
+  <p:timing>
+    <p:tnLst>
+      <p:par>
+        <p:cTn id="1" dur="indefinite" restart="never" nodeType="tmRoot"/>
+      </p:par>
+    </p:tnLst>
+  </p:timing>
 </p:sld>
 </file>
 
@@ -19191,7 +20433,7 @@
           <a:p>
             <a:r>
               <a:rPr lang="en-US" dirty="0" smtClean="0"/>
-              <a:t>TCP</a:t>
+              <a:t>IP</a:t>
             </a:r>
             <a:endParaRPr lang="en-US" dirty="0"/>
           </a:p>
@@ -19214,20 +20456,22 @@
           <a:p>
             <a:r>
               <a:rPr lang="en-US" dirty="0" smtClean="0"/>
-              <a:t>TCP is responsible for chopping up data</a:t>
+              <a:t>IP address -&gt; where we’re going</a:t>
             </a:r>
           </a:p>
           <a:p>
             <a:r>
               <a:rPr lang="en-US" dirty="0" smtClean="0"/>
-              <a:t>TCP is also responsible for putting it back together in the right order</a:t>
+              <a:t>IP restricts size – 64K – but doesn’t care how it gets chopped up</a:t>
             </a:r>
           </a:p>
           <a:p>
             <a:r>
               <a:rPr lang="en-US" dirty="0" smtClean="0"/>
-              <a:t>TCP sends receipts for each piece of data, so if a piece is lost it can be resent</a:t>
-            </a:r>
+              <a:t>IP cares nothing for order or when things arrive</a:t>
+            </a:r>
+          </a:p>
+          <a:p>
             <a:endParaRPr lang="en-US" dirty="0"/>
           </a:p>
         </p:txBody>
@@ -19235,13 +20479,20 @@
     </p:spTree>
     <p:extLst>
       <p:ext uri="{BB962C8B-B14F-4D97-AF65-F5344CB8AC3E}">
-        <p14:creationId xmlns:p14="http://schemas.microsoft.com/office/powerpoint/2010/main" val="2250209779"/>
+        <p14:creationId xmlns:p14="http://schemas.microsoft.com/office/powerpoint/2010/main" val="2745982986"/>
       </p:ext>
     </p:extLst>
   </p:cSld>
   <p:clrMapOvr>
     <a:masterClrMapping/>
   </p:clrMapOvr>
+  <p:timing>
+    <p:tnLst>
+      <p:par>
+        <p:cTn id="1" dur="indefinite" restart="never" nodeType="tmRoot"/>
+      </p:par>
+    </p:tnLst>
+  </p:timing>
 </p:sld>
 </file>
 
@@ -19279,7 +20530,7 @@
           <a:p>
             <a:r>
               <a:rPr lang="en-US" dirty="0" smtClean="0"/>
-              <a:t>HTTP</a:t>
+              <a:t>TCP</a:t>
             </a:r>
             <a:endParaRPr lang="en-US" dirty="0"/>
           </a:p>
@@ -19302,6 +20553,101 @@
           <a:p>
             <a:r>
               <a:rPr lang="en-US" dirty="0" smtClean="0"/>
+              <a:t>TCP is responsible for chopping up data</a:t>
+            </a:r>
+          </a:p>
+          <a:p>
+            <a:r>
+              <a:rPr lang="en-US" dirty="0" smtClean="0"/>
+              <a:t>TCP is also responsible for putting it back together in the right order</a:t>
+            </a:r>
+          </a:p>
+          <a:p>
+            <a:r>
+              <a:rPr lang="en-US" dirty="0" smtClean="0"/>
+              <a:t>TCP sends receipts for each piece of data, so if a piece is lost it can be resent</a:t>
+            </a:r>
+            <a:endParaRPr lang="en-US" dirty="0"/>
+          </a:p>
+        </p:txBody>
+      </p:sp>
+    </p:spTree>
+    <p:extLst>
+      <p:ext uri="{BB962C8B-B14F-4D97-AF65-F5344CB8AC3E}">
+        <p14:creationId xmlns:p14="http://schemas.microsoft.com/office/powerpoint/2010/main" val="2250209779"/>
+      </p:ext>
+    </p:extLst>
+  </p:cSld>
+  <p:clrMapOvr>
+    <a:masterClrMapping/>
+  </p:clrMapOvr>
+  <p:timing>
+    <p:tnLst>
+      <p:par>
+        <p:cTn id="1" dur="indefinite" restart="never" nodeType="tmRoot"/>
+      </p:par>
+    </p:tnLst>
+  </p:timing>
+</p:sld>
+</file>
+
+<file path=ppt/slides/slide8.xml><?xml version="1.0" encoding="utf-8"?>
+<p:sld xmlns:a="http://schemas.openxmlformats.org/drawingml/2006/main" xmlns:r="http://schemas.openxmlformats.org/officeDocument/2006/relationships" xmlns:p="http://schemas.openxmlformats.org/presentationml/2006/main">
+  <p:cSld>
+    <p:spTree>
+      <p:nvGrpSpPr>
+        <p:cNvPr id="1" name=""/>
+        <p:cNvGrpSpPr/>
+        <p:nvPr/>
+      </p:nvGrpSpPr>
+      <p:grpSpPr>
+        <a:xfrm>
+          <a:off x="0" y="0"/>
+          <a:ext cx="0" cy="0"/>
+          <a:chOff x="0" y="0"/>
+          <a:chExt cx="0" cy="0"/>
+        </a:xfrm>
+      </p:grpSpPr>
+      <p:sp>
+        <p:nvSpPr>
+          <p:cNvPr id="2" name="Title 1"/>
+          <p:cNvSpPr>
+            <a:spLocks noGrp="1"/>
+          </p:cNvSpPr>
+          <p:nvPr>
+            <p:ph type="title"/>
+          </p:nvPr>
+        </p:nvSpPr>
+        <p:spPr/>
+        <p:txBody>
+          <a:bodyPr/>
+          <a:lstStyle/>
+          <a:p>
+            <a:r>
+              <a:rPr lang="en-US" dirty="0" smtClean="0"/>
+              <a:t>HTTP</a:t>
+            </a:r>
+            <a:endParaRPr lang="en-US" dirty="0"/>
+          </a:p>
+        </p:txBody>
+      </p:sp>
+      <p:sp>
+        <p:nvSpPr>
+          <p:cNvPr id="3" name="Content Placeholder 2"/>
+          <p:cNvSpPr>
+            <a:spLocks noGrp="1"/>
+          </p:cNvSpPr>
+          <p:nvPr>
+            <p:ph idx="1"/>
+          </p:nvPr>
+        </p:nvSpPr>
+        <p:spPr/>
+        <p:txBody>
+          <a:bodyPr/>
+          <a:lstStyle/>
+          <a:p>
+            <a:r>
+              <a:rPr lang="en-US" dirty="0" smtClean="0"/>
               <a:t>The Hypertext Transfer Protocol (</a:t>
             </a:r>
             <a:r>
@@ -19326,10 +20672,17 @@
   <p:clrMapOvr>
     <a:masterClrMapping/>
   </p:clrMapOvr>
+  <p:timing>
+    <p:tnLst>
+      <p:par>
+        <p:cTn id="1" dur="indefinite" restart="never" nodeType="tmRoot"/>
+      </p:par>
+    </p:tnLst>
+  </p:timing>
 </p:sld>
 </file>
 
-<file path=ppt/slides/slide8.xml><?xml version="1.0" encoding="utf-8"?>
+<file path=ppt/slides/slide9.xml><?xml version="1.0" encoding="utf-8"?>
 <p:sld xmlns:a="http://schemas.openxmlformats.org/drawingml/2006/main" xmlns:r="http://schemas.openxmlformats.org/officeDocument/2006/relationships" xmlns:p="http://schemas.openxmlformats.org/presentationml/2006/main">
   <p:cSld>
     <p:spTree>
@@ -19426,94 +20779,13 @@
   <p:clrMapOvr>
     <a:masterClrMapping/>
   </p:clrMapOvr>
-</p:sld>
-</file>
-
-<file path=ppt/slides/slide9.xml><?xml version="1.0" encoding="utf-8"?>
-<p:sld xmlns:a="http://schemas.openxmlformats.org/drawingml/2006/main" xmlns:r="http://schemas.openxmlformats.org/officeDocument/2006/relationships" xmlns:p="http://schemas.openxmlformats.org/presentationml/2006/main">
-  <p:cSld>
-    <p:spTree>
-      <p:nvGrpSpPr>
-        <p:cNvPr id="1" name=""/>
-        <p:cNvGrpSpPr/>
-        <p:nvPr/>
-      </p:nvGrpSpPr>
-      <p:grpSpPr>
-        <a:xfrm>
-          <a:off x="0" y="0"/>
-          <a:ext cx="0" cy="0"/>
-          <a:chOff x="0" y="0"/>
-          <a:chExt cx="0" cy="0"/>
-        </a:xfrm>
-      </p:grpSpPr>
-      <p:sp>
-        <p:nvSpPr>
-          <p:cNvPr id="2" name="Title 1"/>
-          <p:cNvSpPr>
-            <a:spLocks noGrp="1"/>
-          </p:cNvSpPr>
-          <p:nvPr>
-            <p:ph type="title"/>
-          </p:nvPr>
-        </p:nvSpPr>
-        <p:spPr/>
-        <p:txBody>
-          <a:bodyPr/>
-          <a:lstStyle/>
-          <a:p>
-            <a:r>
-              <a:rPr lang="en-US" dirty="0" smtClean="0"/>
-              <a:t>Features of HTTP</a:t>
-            </a:r>
-            <a:endParaRPr lang="en-US" dirty="0"/>
-          </a:p>
-        </p:txBody>
-      </p:sp>
-      <p:sp>
-        <p:nvSpPr>
-          <p:cNvPr id="3" name="Content Placeholder 2"/>
-          <p:cNvSpPr>
-            <a:spLocks noGrp="1"/>
-          </p:cNvSpPr>
-          <p:nvPr>
-            <p:ph idx="1"/>
-          </p:nvPr>
-        </p:nvSpPr>
-        <p:spPr/>
-        <p:txBody>
-          <a:bodyPr/>
-          <a:lstStyle/>
-          <a:p>
-            <a:r>
-              <a:rPr lang="en-US" dirty="0" smtClean="0"/>
-              <a:t>connectionless – make the request, then disconnect and wait for the server to talk back</a:t>
-            </a:r>
-          </a:p>
-          <a:p>
-            <a:r>
-              <a:rPr lang="en-US" dirty="0" smtClean="0"/>
-              <a:t>media independent – anything can be sent, as long as you attach the type of content being sent</a:t>
-            </a:r>
-          </a:p>
-          <a:p>
-            <a:r>
-              <a:rPr lang="en-US" dirty="0" smtClean="0"/>
-              <a:t>stateless – server and client only know about each other during the request, afterwards they forget it happened</a:t>
-            </a:r>
-            <a:endParaRPr lang="en-US" dirty="0"/>
-          </a:p>
-        </p:txBody>
-      </p:sp>
-    </p:spTree>
-    <p:extLst>
-      <p:ext uri="{BB962C8B-B14F-4D97-AF65-F5344CB8AC3E}">
-        <p14:creationId xmlns:p14="http://schemas.microsoft.com/office/powerpoint/2010/main" val="1860090848"/>
-      </p:ext>
-    </p:extLst>
-  </p:cSld>
-  <p:clrMapOvr>
-    <a:masterClrMapping/>
-  </p:clrMapOvr>
+  <p:timing>
+    <p:tnLst>
+      <p:par>
+        <p:cTn id="1" dur="indefinite" restart="never" nodeType="tmRoot"/>
+      </p:par>
+    </p:tnLst>
+  </p:timing>
 </p:sld>
 </file>
 

</xml_diff>

<commit_message>
Add more tools to the HTTP Tools slide
</commit_message>
<xml_diff>
--- a/course/2 - The Internet/The Internet.pptx
+++ b/course/2 - The Internet/The Internet.pptx
@@ -7756,101 +7756,115 @@
           <a:bodyPr/>
           <a:lstStyle/>
           <a:p>
-            <a:pPr marL="308609" indent="-308609" defTabSz="411479">
+            <a:pPr marL="257175" indent="-257175" defTabSz="342900">
               <a:lnSpc>
                 <a:spcPct val="90000"/>
               </a:lnSpc>
               <a:spcBef>
-                <a:spcPts val="600"/>
+                <a:spcPts val="500"/>
               </a:spcBef>
-              <a:defRPr sz="2880"/>
+              <a:defRPr sz="2400"/>
             </a:pPr>
             <a:r>
               <a:t>Your browser</a:t>
             </a:r>
           </a:p>
           <a:p>
-            <a:pPr lvl="1" marL="668654" indent="-257175" defTabSz="411479">
+            <a:pPr lvl="1" marL="557212" indent="-214312" defTabSz="342900">
               <a:lnSpc>
                 <a:spcPct val="90000"/>
               </a:lnSpc>
               <a:spcBef>
-                <a:spcPts val="600"/>
+                <a:spcPts val="500"/>
               </a:spcBef>
-              <a:defRPr sz="2520"/>
+              <a:defRPr sz="2100"/>
             </a:pPr>
             <a:r>
               <a:t>Safari</a:t>
             </a:r>
           </a:p>
           <a:p>
-            <a:pPr lvl="1" marL="668654" indent="-257175" defTabSz="411479">
+            <a:pPr lvl="1" marL="557212" indent="-214312" defTabSz="342900">
               <a:lnSpc>
                 <a:spcPct val="90000"/>
               </a:lnSpc>
               <a:spcBef>
-                <a:spcPts val="600"/>
+                <a:spcPts val="500"/>
               </a:spcBef>
-              <a:defRPr sz="2520"/>
+              <a:defRPr sz="2100"/>
             </a:pPr>
             <a:r>
               <a:t>Chrome</a:t>
             </a:r>
           </a:p>
           <a:p>
-            <a:pPr lvl="1" marL="668654" indent="-257175" defTabSz="411479">
+            <a:pPr lvl="1" marL="557212" indent="-214312" defTabSz="342900">
               <a:lnSpc>
                 <a:spcPct val="90000"/>
               </a:lnSpc>
               <a:spcBef>
-                <a:spcPts val="600"/>
+                <a:spcPts val="500"/>
               </a:spcBef>
-              <a:defRPr sz="2520"/>
+              <a:defRPr sz="2100"/>
             </a:pPr>
             <a:r>
               <a:t>Firefox</a:t>
             </a:r>
           </a:p>
           <a:p>
-            <a:pPr lvl="1" marL="668654" indent="-257175" defTabSz="411479">
+            <a:pPr lvl="1" marL="557212" indent="-214312" defTabSz="342900">
               <a:lnSpc>
                 <a:spcPct val="90000"/>
               </a:lnSpc>
               <a:spcBef>
-                <a:spcPts val="600"/>
+                <a:spcPts val="500"/>
               </a:spcBef>
-              <a:defRPr sz="2520"/>
+              <a:defRPr sz="2100"/>
             </a:pPr>
             <a:r>
               <a:t>IE</a:t>
             </a:r>
           </a:p>
           <a:p>
-            <a:pPr marL="308609" indent="-308609" defTabSz="411479">
+            <a:pPr marL="257175" indent="-257175" defTabSz="342900">
               <a:lnSpc>
                 <a:spcPct val="90000"/>
               </a:lnSpc>
               <a:spcBef>
-                <a:spcPts val="600"/>
+                <a:spcPts val="500"/>
               </a:spcBef>
-              <a:defRPr sz="2880"/>
+              <a:defRPr sz="2400"/>
             </a:pPr>
             <a:r>
               <a:t>Tools</a:t>
             </a:r>
           </a:p>
           <a:p>
-            <a:pPr lvl="1" marL="668654" indent="-257175" defTabSz="411479">
+            <a:pPr lvl="1" marL="557212" indent="-214312" defTabSz="342900">
               <a:lnSpc>
                 <a:spcPct val="90000"/>
               </a:lnSpc>
               <a:spcBef>
-                <a:spcPts val="600"/>
+                <a:spcPts val="500"/>
               </a:spcBef>
-              <a:defRPr sz="2520"/>
-            </a:pPr>
-            <a:r>
-              <a:t>httpie - </a:t>
+              <a:defRPr sz="2100"/>
+            </a:pPr>
+            <a:r>
+              <a:t>Your browser’s Web Developer toolbar</a:t>
+            </a:r>
+          </a:p>
+          <a:p>
+            <a:pPr lvl="1" marL="557212" indent="-214312" defTabSz="342900">
+              <a:lnSpc>
+                <a:spcPct val="90000"/>
+              </a:lnSpc>
+              <a:spcBef>
+                <a:spcPts val="500"/>
+              </a:spcBef>
+              <a:defRPr sz="2100"/>
+            </a:pPr>
+            <a:r>
+              <a:t>Fiddler web debugging proxy - </a:t>
             </a:r>
             <a:r>
               <a:rPr u="sng">
@@ -7864,24 +7878,24 @@
                 </a:uFill>
                 <a:hlinkClick r:id="rId3" invalidUrl="" action="" tgtFrame="" tooltip="" history="1" highlightClick="0" endSnd="0"/>
               </a:rPr>
-              <a:t>httpie.org</a:t>
+              <a:t>www.telerik.com/fiddler</a:t>
             </a:r>
             <a:r>
               <a:t> </a:t>
             </a:r>
           </a:p>
           <a:p>
-            <a:pPr lvl="1" marL="668654" indent="-257175" defTabSz="411479">
+            <a:pPr lvl="1" marL="557212" indent="-214312" defTabSz="342900">
               <a:lnSpc>
                 <a:spcPct val="90000"/>
               </a:lnSpc>
               <a:spcBef>
-                <a:spcPts val="600"/>
+                <a:spcPts val="500"/>
               </a:spcBef>
-              <a:defRPr sz="2520"/>
-            </a:pPr>
-            <a:r>
-              <a:t>curl - </a:t>
+              <a:defRPr sz="2100"/>
+            </a:pPr>
+            <a:r>
+              <a:t>httpie - </a:t>
             </a:r>
             <a:r>
               <a:rPr u="sng">
@@ -7895,38 +7909,69 @@
                 </a:uFill>
                 <a:hlinkClick r:id="rId4" invalidUrl="" action="" tgtFrame="" tooltip="" history="1" highlightClick="0" endSnd="0"/>
               </a:rPr>
-              <a:t>curl.haxx.se/docs/manpage.html</a:t>
+              <a:t>httpie.org</a:t>
             </a:r>
             <a:r>
               <a:t> </a:t>
             </a:r>
           </a:p>
           <a:p>
-            <a:pPr marL="308609" indent="-308609" defTabSz="411479">
+            <a:pPr lvl="1" marL="557212" indent="-214312" defTabSz="342900">
               <a:lnSpc>
                 <a:spcPct val="90000"/>
               </a:lnSpc>
               <a:spcBef>
-                <a:spcPts val="600"/>
+                <a:spcPts val="500"/>
               </a:spcBef>
-              <a:defRPr sz="2880"/>
-            </a:pPr>
-            <a:r>
-              <a:t>Programs</a:t>
-            </a:r>
-          </a:p>
-          <a:p>
-            <a:pPr lvl="1" marL="668654" indent="-257175" defTabSz="411479">
+              <a:defRPr sz="2100"/>
+            </a:pPr>
+            <a:r>
+              <a:t>curl - </a:t>
+            </a:r>
+            <a:r>
+              <a:rPr u="sng">
+                <a:solidFill>
+                  <a:srgbClr val="0000FF"/>
+                </a:solidFill>
+                <a:uFill>
+                  <a:solidFill>
+                    <a:srgbClr val="0000FF"/>
+                  </a:solidFill>
+                </a:uFill>
+                <a:hlinkClick r:id="rId5" invalidUrl="" action="" tgtFrame="" tooltip="" history="1" highlightClick="0" endSnd="0"/>
+              </a:rPr>
+              <a:t>curl.haxx.se/docs/manpage.html</a:t>
+            </a:r>
+            <a:r>
+              <a:t> </a:t>
+            </a:r>
+          </a:p>
+          <a:p>
+            <a:pPr marL="257175" indent="-257175" defTabSz="342900">
               <a:lnSpc>
                 <a:spcPct val="90000"/>
               </a:lnSpc>
               <a:spcBef>
-                <a:spcPts val="600"/>
+                <a:spcPts val="500"/>
               </a:spcBef>
-              <a:defRPr sz="2520"/>
-            </a:pPr>
-            <a:r>
-              <a:t>requesting via code</a:t>
+              <a:defRPr sz="2400"/>
+            </a:pPr>
+            <a:r>
+              <a:t>Programs</a:t>
+            </a:r>
+          </a:p>
+          <a:p>
+            <a:pPr lvl="1" marL="557212" indent="-214312" defTabSz="342900">
+              <a:lnSpc>
+                <a:spcPct val="90000"/>
+              </a:lnSpc>
+              <a:spcBef>
+                <a:spcPts val="500"/>
+              </a:spcBef>
+              <a:defRPr sz="2100"/>
+            </a:pPr>
+            <a:r>
+              <a:t>requesting via code (i.e. file_get_contents() in PHP, etc.)</a:t>
             </a:r>
           </a:p>
         </p:txBody>

</xml_diff>